<commit_message>
Working and documented 2DEG example
</commit_message>
<xml_diff>
--- a/examples/1_3D_2DEG/2DEG example.pptx
+++ b/examples/1_3D_2DEG/2DEG example.pptx
@@ -7,10 +7,10 @@
     <p:sldMasterId id="2147484495" r:id="rId6"/>
   </p:sldMasterIdLst>
   <p:notesMasterIdLst>
-    <p:notesMasterId r:id="rId29"/>
+    <p:notesMasterId r:id="rId27"/>
   </p:notesMasterIdLst>
   <p:handoutMasterIdLst>
-    <p:handoutMasterId r:id="rId30"/>
+    <p:handoutMasterId r:id="rId28"/>
   </p:handoutMasterIdLst>
   <p:sldIdLst>
     <p:sldId id="1551" r:id="rId7"/>
@@ -28,13 +28,11 @@
     <p:sldId id="1575" r:id="rId19"/>
     <p:sldId id="1566" r:id="rId20"/>
     <p:sldId id="1567" r:id="rId21"/>
-    <p:sldId id="1568" r:id="rId22"/>
-    <p:sldId id="1569" r:id="rId23"/>
-    <p:sldId id="1570" r:id="rId24"/>
-    <p:sldId id="1571" r:id="rId25"/>
-    <p:sldId id="1563" r:id="rId26"/>
-    <p:sldId id="1572" r:id="rId27"/>
-    <p:sldId id="1564" r:id="rId28"/>
+    <p:sldId id="1570" r:id="rId22"/>
+    <p:sldId id="1571" r:id="rId23"/>
+    <p:sldId id="1563" r:id="rId24"/>
+    <p:sldId id="1572" r:id="rId25"/>
+    <p:sldId id="1564" r:id="rId26"/>
   </p:sldIdLst>
   <p:sldSz cx="12436475" cy="6994525"/>
   <p:notesSz cx="6858000" cy="9144000"/>
@@ -178,627 +176,6 @@
 
 <file path=ppt/changesInfos/changesInfo1.xml><?xml version="1.0" encoding="utf-8"?>
 <pc:chgInfo xmlns:a="http://schemas.openxmlformats.org/drawingml/2006/main" xmlns:r="http://schemas.openxmlformats.org/officeDocument/2006/relationships" xmlns:ac="http://schemas.microsoft.com/office/drawing/2013/main/command" xmlns:pc="http://schemas.microsoft.com/office/powerpoint/2013/main/command">
-  <pc:docChgLst>
-    <pc:chgData name="Kevin Van Hoogdalem" userId="a04451ef-be22-40ce-b8a8-68f07bdaa89c" providerId="ADAL" clId="{A12536A5-8C6D-4C80-9542-005399029E22}"/>
-    <pc:docChg chg="custSel addSld delSld modSld">
-      <pc:chgData name="Kevin Van Hoogdalem" userId="a04451ef-be22-40ce-b8a8-68f07bdaa89c" providerId="ADAL" clId="{A12536A5-8C6D-4C80-9542-005399029E22}" dt="2017-12-07T19:31:59.569" v="5124" actId="255"/>
-      <pc:docMkLst>
-        <pc:docMk/>
-      </pc:docMkLst>
-      <pc:sldChg chg="modSp">
-        <pc:chgData name="Kevin Van Hoogdalem" userId="a04451ef-be22-40ce-b8a8-68f07bdaa89c" providerId="ADAL" clId="{A12536A5-8C6D-4C80-9542-005399029E22}" dt="2017-12-07T18:11:00.031" v="228" actId="20577"/>
-        <pc:sldMkLst>
-          <pc:docMk/>
-          <pc:sldMk cId="4132783674" sldId="1551"/>
-        </pc:sldMkLst>
-        <pc:spChg chg="mod">
-          <ac:chgData name="Kevin Van Hoogdalem" userId="a04451ef-be22-40ce-b8a8-68f07bdaa89c" providerId="ADAL" clId="{A12536A5-8C6D-4C80-9542-005399029E22}" dt="2017-12-07T18:11:00.031" v="228" actId="20577"/>
-          <ac:spMkLst>
-            <pc:docMk/>
-            <pc:sldMk cId="4132783674" sldId="1551"/>
-            <ac:spMk id="6" creationId="{00000000-0000-0000-0000-000000000000}"/>
-          </ac:spMkLst>
-        </pc:spChg>
-      </pc:sldChg>
-      <pc:sldChg chg="addSp delSp modSp">
-        <pc:chgData name="Kevin Van Hoogdalem" userId="a04451ef-be22-40ce-b8a8-68f07bdaa89c" providerId="ADAL" clId="{A12536A5-8C6D-4C80-9542-005399029E22}" dt="2017-12-07T02:41:46.452" v="9" actId="478"/>
-        <pc:sldMkLst>
-          <pc:docMk/>
-          <pc:sldMk cId="4145435315" sldId="1562"/>
-        </pc:sldMkLst>
-        <pc:picChg chg="del">
-          <ac:chgData name="Kevin Van Hoogdalem" userId="a04451ef-be22-40ce-b8a8-68f07bdaa89c" providerId="ADAL" clId="{A12536A5-8C6D-4C80-9542-005399029E22}" dt="2017-12-07T02:41:46.452" v="9" actId="478"/>
-          <ac:picMkLst>
-            <pc:docMk/>
-            <pc:sldMk cId="4145435315" sldId="1562"/>
-            <ac:picMk id="2" creationId="{1D29B1F1-1444-4AED-B758-2AE113B6973B}"/>
-          </ac:picMkLst>
-        </pc:picChg>
-        <pc:picChg chg="add del mod">
-          <ac:chgData name="Kevin Van Hoogdalem" userId="a04451ef-be22-40ce-b8a8-68f07bdaa89c" providerId="ADAL" clId="{A12536A5-8C6D-4C80-9542-005399029E22}" dt="2017-12-07T02:39:52.849" v="5" actId="478"/>
-          <ac:picMkLst>
-            <pc:docMk/>
-            <pc:sldMk cId="4145435315" sldId="1562"/>
-            <ac:picMk id="3" creationId="{BBBF619B-069D-4C8D-A9AE-F6E911112DE2}"/>
-          </ac:picMkLst>
-        </pc:picChg>
-        <pc:picChg chg="add del mod">
-          <ac:chgData name="Kevin Van Hoogdalem" userId="a04451ef-be22-40ce-b8a8-68f07bdaa89c" providerId="ADAL" clId="{A12536A5-8C6D-4C80-9542-005399029E22}" dt="2017-12-07T02:41:46.452" v="9" actId="478"/>
-          <ac:picMkLst>
-            <pc:docMk/>
-            <pc:sldMk cId="4145435315" sldId="1562"/>
-            <ac:picMk id="4" creationId="{B759BB42-DF39-4146-9E68-D0452F93A3CD}"/>
-          </ac:picMkLst>
-        </pc:picChg>
-        <pc:picChg chg="add del mod">
-          <ac:chgData name="Kevin Van Hoogdalem" userId="a04451ef-be22-40ce-b8a8-68f07bdaa89c" providerId="ADAL" clId="{A12536A5-8C6D-4C80-9542-005399029E22}" dt="2017-12-07T02:41:46.452" v="9" actId="478"/>
-          <ac:picMkLst>
-            <pc:docMk/>
-            <pc:sldMk cId="4145435315" sldId="1562"/>
-            <ac:picMk id="5" creationId="{514F5E60-C1DD-40E5-8E28-5C537C0DB355}"/>
-          </ac:picMkLst>
-        </pc:picChg>
-      </pc:sldChg>
-      <pc:sldChg chg="delSp modSp add">
-        <pc:chgData name="Kevin Van Hoogdalem" userId="a04451ef-be22-40ce-b8a8-68f07bdaa89c" providerId="ADAL" clId="{A12536A5-8C6D-4C80-9542-005399029E22}" dt="2017-12-07T02:42:15.200" v="29" actId="20577"/>
-        <pc:sldMkLst>
-          <pc:docMk/>
-          <pc:sldMk cId="2257676999" sldId="1563"/>
-        </pc:sldMkLst>
-        <pc:spChg chg="mod">
-          <ac:chgData name="Kevin Van Hoogdalem" userId="a04451ef-be22-40ce-b8a8-68f07bdaa89c" providerId="ADAL" clId="{A12536A5-8C6D-4C80-9542-005399029E22}" dt="2017-12-07T02:42:15.200" v="29" actId="20577"/>
-          <ac:spMkLst>
-            <pc:docMk/>
-            <pc:sldMk cId="2257676999" sldId="1563"/>
-            <ac:spMk id="17" creationId="{00000000-0000-0000-0000-000000000000}"/>
-          </ac:spMkLst>
-        </pc:spChg>
-        <pc:picChg chg="del">
-          <ac:chgData name="Kevin Van Hoogdalem" userId="a04451ef-be22-40ce-b8a8-68f07bdaa89c" providerId="ADAL" clId="{A12536A5-8C6D-4C80-9542-005399029E22}" dt="2017-12-07T02:42:06.967" v="19" actId="20577"/>
-          <ac:picMkLst>
-            <pc:docMk/>
-            <pc:sldMk cId="2257676999" sldId="1563"/>
-            <ac:picMk id="2" creationId="{1D29B1F1-1444-4AED-B758-2AE113B6973B}"/>
-          </ac:picMkLst>
-        </pc:picChg>
-        <pc:picChg chg="del">
-          <ac:chgData name="Kevin Van Hoogdalem" userId="a04451ef-be22-40ce-b8a8-68f07bdaa89c" providerId="ADAL" clId="{A12536A5-8C6D-4C80-9542-005399029E22}" dt="2017-12-07T02:42:06.967" v="19" actId="20577"/>
-          <ac:picMkLst>
-            <pc:docMk/>
-            <pc:sldMk cId="2257676999" sldId="1563"/>
-            <ac:picMk id="4" creationId="{B759BB42-DF39-4146-9E68-D0452F93A3CD}"/>
-          </ac:picMkLst>
-        </pc:picChg>
-        <pc:picChg chg="del">
-          <ac:chgData name="Kevin Van Hoogdalem" userId="a04451ef-be22-40ce-b8a8-68f07bdaa89c" providerId="ADAL" clId="{A12536A5-8C6D-4C80-9542-005399029E22}" dt="2017-12-07T02:42:06.967" v="19" actId="20577"/>
-          <ac:picMkLst>
-            <pc:docMk/>
-            <pc:sldMk cId="2257676999" sldId="1563"/>
-            <ac:picMk id="5" creationId="{514F5E60-C1DD-40E5-8E28-5C537C0DB355}"/>
-          </ac:picMkLst>
-        </pc:picChg>
-      </pc:sldChg>
-      <pc:sldChg chg="addSp delSp modSp add">
-        <pc:chgData name="Kevin Van Hoogdalem" userId="a04451ef-be22-40ce-b8a8-68f07bdaa89c" providerId="ADAL" clId="{A12536A5-8C6D-4C80-9542-005399029E22}" dt="2017-12-07T04:14:18.787" v="216" actId="20577"/>
-        <pc:sldMkLst>
-          <pc:docMk/>
-          <pc:sldMk cId="747649839" sldId="1564"/>
-        </pc:sldMkLst>
-        <pc:spChg chg="mod">
-          <ac:chgData name="Kevin Van Hoogdalem" userId="a04451ef-be22-40ce-b8a8-68f07bdaa89c" providerId="ADAL" clId="{A12536A5-8C6D-4C80-9542-005399029E22}" dt="2017-12-07T04:14:18.787" v="216" actId="20577"/>
-          <ac:spMkLst>
-            <pc:docMk/>
-            <pc:sldMk cId="747649839" sldId="1564"/>
-            <ac:spMk id="6" creationId="{00000000-0000-0000-0000-000000000000}"/>
-          </ac:spMkLst>
-        </pc:spChg>
-        <pc:spChg chg="del">
-          <ac:chgData name="Kevin Van Hoogdalem" userId="a04451ef-be22-40ce-b8a8-68f07bdaa89c" providerId="ADAL" clId="{A12536A5-8C6D-4C80-9542-005399029E22}" dt="2017-12-07T02:41:58.624" v="11" actId="478"/>
-          <ac:spMkLst>
-            <pc:docMk/>
-            <pc:sldMk cId="747649839" sldId="1564"/>
-            <ac:spMk id="7" creationId="{3C94AF72-E908-4C98-868A-0E5BF3818ABB}"/>
-          </ac:spMkLst>
-        </pc:spChg>
-        <pc:spChg chg="mod">
-          <ac:chgData name="Kevin Van Hoogdalem" userId="a04451ef-be22-40ce-b8a8-68f07bdaa89c" providerId="ADAL" clId="{A12536A5-8C6D-4C80-9542-005399029E22}" dt="2017-12-07T02:42:02.569" v="18" actId="20577"/>
-          <ac:spMkLst>
-            <pc:docMk/>
-            <pc:sldMk cId="747649839" sldId="1564"/>
-            <ac:spMk id="17" creationId="{00000000-0000-0000-0000-000000000000}"/>
-          </ac:spMkLst>
-        </pc:spChg>
-        <pc:picChg chg="del">
-          <ac:chgData name="Kevin Van Hoogdalem" userId="a04451ef-be22-40ce-b8a8-68f07bdaa89c" providerId="ADAL" clId="{A12536A5-8C6D-4C80-9542-005399029E22}" dt="2017-12-07T02:41:58.624" v="11" actId="478"/>
-          <ac:picMkLst>
-            <pc:docMk/>
-            <pc:sldMk cId="747649839" sldId="1564"/>
-            <ac:picMk id="2" creationId="{A5EA68D1-274B-4444-A4E9-6956056F52A0}"/>
-          </ac:picMkLst>
-        </pc:picChg>
-        <pc:picChg chg="add mod">
-          <ac:chgData name="Kevin Van Hoogdalem" userId="a04451ef-be22-40ce-b8a8-68f07bdaa89c" providerId="ADAL" clId="{A12536A5-8C6D-4C80-9542-005399029E22}" dt="2017-12-07T04:05:20.230" v="191" actId="1076"/>
-          <ac:picMkLst>
-            <pc:docMk/>
-            <pc:sldMk cId="747649839" sldId="1564"/>
-            <ac:picMk id="3" creationId="{9E962D96-0C76-44AE-9A4B-96A714689099}"/>
-          </ac:picMkLst>
-        </pc:picChg>
-        <pc:picChg chg="add mod">
-          <ac:chgData name="Kevin Van Hoogdalem" userId="a04451ef-be22-40ce-b8a8-68f07bdaa89c" providerId="ADAL" clId="{A12536A5-8C6D-4C80-9542-005399029E22}" dt="2017-12-07T04:05:21.793" v="192" actId="1076"/>
-          <ac:picMkLst>
-            <pc:docMk/>
-            <pc:sldMk cId="747649839" sldId="1564"/>
-            <ac:picMk id="4" creationId="{4BE7CB89-3A40-4C5F-942D-2A8AE6045099}"/>
-          </ac:picMkLst>
-        </pc:picChg>
-        <pc:picChg chg="add del mod">
-          <ac:chgData name="Kevin Van Hoogdalem" userId="a04451ef-be22-40ce-b8a8-68f07bdaa89c" providerId="ADAL" clId="{A12536A5-8C6D-4C80-9542-005399029E22}" dt="2017-12-07T02:42:25.876" v="32" actId="478"/>
-          <ac:picMkLst>
-            <pc:docMk/>
-            <pc:sldMk cId="747649839" sldId="1564"/>
-            <ac:picMk id="8" creationId="{5E8C6351-1BEE-4EFB-897C-269480DB04B1}"/>
-          </ac:picMkLst>
-        </pc:picChg>
-        <pc:picChg chg="add mod">
-          <ac:chgData name="Kevin Van Hoogdalem" userId="a04451ef-be22-40ce-b8a8-68f07bdaa89c" providerId="ADAL" clId="{A12536A5-8C6D-4C80-9542-005399029E22}" dt="2017-12-07T03:00:15.568" v="151" actId="1076"/>
-          <ac:picMkLst>
-            <pc:docMk/>
-            <pc:sldMk cId="747649839" sldId="1564"/>
-            <ac:picMk id="9" creationId="{3026057A-0636-429C-98F8-E341C6423E94}"/>
-          </ac:picMkLst>
-        </pc:picChg>
-        <pc:picChg chg="add mod">
-          <ac:chgData name="Kevin Van Hoogdalem" userId="a04451ef-be22-40ce-b8a8-68f07bdaa89c" providerId="ADAL" clId="{A12536A5-8C6D-4C80-9542-005399029E22}" dt="2017-12-07T03:00:08.116" v="148" actId="1076"/>
-          <ac:picMkLst>
-            <pc:docMk/>
-            <pc:sldMk cId="747649839" sldId="1564"/>
-            <ac:picMk id="10" creationId="{9C888A9E-9DFC-4AE2-B2CF-FF12D47BD44A}"/>
-          </ac:picMkLst>
-        </pc:picChg>
-      </pc:sldChg>
-      <pc:sldChg chg="delSp modSp add del">
-        <pc:chgData name="Kevin Van Hoogdalem" userId="a04451ef-be22-40ce-b8a8-68f07bdaa89c" providerId="ADAL" clId="{A12536A5-8C6D-4C80-9542-005399029E22}" dt="2017-12-07T19:10:51.733" v="2910" actId="2696"/>
-        <pc:sldMkLst>
-          <pc:docMk/>
-          <pc:sldMk cId="3455608382" sldId="1565"/>
-        </pc:sldMkLst>
-        <pc:spChg chg="mod">
-          <ac:chgData name="Kevin Van Hoogdalem" userId="a04451ef-be22-40ce-b8a8-68f07bdaa89c" providerId="ADAL" clId="{A12536A5-8C6D-4C80-9542-005399029E22}" dt="2017-12-07T18:32:42.853" v="952" actId="20577"/>
-          <ac:spMkLst>
-            <pc:docMk/>
-            <pc:sldMk cId="3455608382" sldId="1565"/>
-            <ac:spMk id="6" creationId="{00000000-0000-0000-0000-000000000000}"/>
-          </ac:spMkLst>
-        </pc:spChg>
-        <pc:spChg chg="del">
-          <ac:chgData name="Kevin Van Hoogdalem" userId="a04451ef-be22-40ce-b8a8-68f07bdaa89c" providerId="ADAL" clId="{A12536A5-8C6D-4C80-9542-005399029E22}" dt="2017-12-07T18:16:19.078" v="456" actId="478"/>
-          <ac:spMkLst>
-            <pc:docMk/>
-            <pc:sldMk cId="3455608382" sldId="1565"/>
-            <ac:spMk id="7" creationId="{3C94AF72-E908-4C98-868A-0E5BF3818ABB}"/>
-          </ac:spMkLst>
-        </pc:spChg>
-        <pc:spChg chg="del">
-          <ac:chgData name="Kevin Van Hoogdalem" userId="a04451ef-be22-40ce-b8a8-68f07bdaa89c" providerId="ADAL" clId="{A12536A5-8C6D-4C80-9542-005399029E22}" dt="2017-12-07T18:16:31.230" v="458" actId="478"/>
-          <ac:spMkLst>
-            <pc:docMk/>
-            <pc:sldMk cId="3455608382" sldId="1565"/>
-            <ac:spMk id="8" creationId="{D2CD71FB-2D65-4ABB-A28F-182CF5178FCE}"/>
-          </ac:spMkLst>
-        </pc:spChg>
-        <pc:spChg chg="mod">
-          <ac:chgData name="Kevin Van Hoogdalem" userId="a04451ef-be22-40ce-b8a8-68f07bdaa89c" providerId="ADAL" clId="{A12536A5-8C6D-4C80-9542-005399029E22}" dt="2017-12-07T18:14:16.649" v="247" actId="20577"/>
-          <ac:spMkLst>
-            <pc:docMk/>
-            <pc:sldMk cId="3455608382" sldId="1565"/>
-            <ac:spMk id="17" creationId="{00000000-0000-0000-0000-000000000000}"/>
-          </ac:spMkLst>
-        </pc:spChg>
-        <pc:picChg chg="del">
-          <ac:chgData name="Kevin Van Hoogdalem" userId="a04451ef-be22-40ce-b8a8-68f07bdaa89c" providerId="ADAL" clId="{A12536A5-8C6D-4C80-9542-005399029E22}" dt="2017-12-07T18:16:28.714" v="457" actId="478"/>
-          <ac:picMkLst>
-            <pc:docMk/>
-            <pc:sldMk cId="3455608382" sldId="1565"/>
-            <ac:picMk id="3" creationId="{475F5D8C-D4F5-4C6A-8AAC-6E09E46BFE46}"/>
-          </ac:picMkLst>
-        </pc:picChg>
-        <pc:picChg chg="del">
-          <ac:chgData name="Kevin Van Hoogdalem" userId="a04451ef-be22-40ce-b8a8-68f07bdaa89c" providerId="ADAL" clId="{A12536A5-8C6D-4C80-9542-005399029E22}" dt="2017-12-07T18:16:19.078" v="456" actId="478"/>
-          <ac:picMkLst>
-            <pc:docMk/>
-            <pc:sldMk cId="3455608382" sldId="1565"/>
-            <ac:picMk id="4" creationId="{822C3552-8664-4E04-88B9-7C6E9BFC42A4}"/>
-          </ac:picMkLst>
-        </pc:picChg>
-        <pc:picChg chg="del">
-          <ac:chgData name="Kevin Van Hoogdalem" userId="a04451ef-be22-40ce-b8a8-68f07bdaa89c" providerId="ADAL" clId="{A12536A5-8C6D-4C80-9542-005399029E22}" dt="2017-12-07T18:16:19.078" v="456" actId="478"/>
-          <ac:picMkLst>
-            <pc:docMk/>
-            <pc:sldMk cId="3455608382" sldId="1565"/>
-            <ac:picMk id="5" creationId="{22D2DDE6-3531-4A8E-9F0E-23B434511D28}"/>
-          </ac:picMkLst>
-        </pc:picChg>
-      </pc:sldChg>
-      <pc:sldChg chg="addSp modSp add">
-        <pc:chgData name="Kevin Van Hoogdalem" userId="a04451ef-be22-40ce-b8a8-68f07bdaa89c" providerId="ADAL" clId="{A12536A5-8C6D-4C80-9542-005399029E22}" dt="2017-12-07T19:11:10.135" v="2947" actId="20577"/>
-        <pc:sldMkLst>
-          <pc:docMk/>
-          <pc:sldMk cId="4272987819" sldId="1566"/>
-        </pc:sldMkLst>
-        <pc:spChg chg="mod">
-          <ac:chgData name="Kevin Van Hoogdalem" userId="a04451ef-be22-40ce-b8a8-68f07bdaa89c" providerId="ADAL" clId="{A12536A5-8C6D-4C80-9542-005399029E22}" dt="2017-12-07T19:07:02.175" v="2852" actId="6549"/>
-          <ac:spMkLst>
-            <pc:docMk/>
-            <pc:sldMk cId="4272987819" sldId="1566"/>
-            <ac:spMk id="6" creationId="{00000000-0000-0000-0000-000000000000}"/>
-          </ac:spMkLst>
-        </pc:spChg>
-        <pc:spChg chg="mod">
-          <ac:chgData name="Kevin Van Hoogdalem" userId="a04451ef-be22-40ce-b8a8-68f07bdaa89c" providerId="ADAL" clId="{A12536A5-8C6D-4C80-9542-005399029E22}" dt="2017-12-07T19:11:10.135" v="2947" actId="20577"/>
-          <ac:spMkLst>
-            <pc:docMk/>
-            <pc:sldMk cId="4272987819" sldId="1566"/>
-            <ac:spMk id="17" creationId="{00000000-0000-0000-0000-000000000000}"/>
-          </ac:spMkLst>
-        </pc:spChg>
-        <pc:picChg chg="add mod">
-          <ac:chgData name="Kevin Van Hoogdalem" userId="a04451ef-be22-40ce-b8a8-68f07bdaa89c" providerId="ADAL" clId="{A12536A5-8C6D-4C80-9542-005399029E22}" dt="2017-12-07T19:07:15.017" v="2855" actId="12788"/>
-          <ac:picMkLst>
-            <pc:docMk/>
-            <pc:sldMk cId="4272987819" sldId="1566"/>
-            <ac:picMk id="2" creationId="{91609CEF-0C4C-4A8E-B756-65F66799A226}"/>
-          </ac:picMkLst>
-        </pc:picChg>
-        <pc:picChg chg="add mod">
-          <ac:chgData name="Kevin Van Hoogdalem" userId="a04451ef-be22-40ce-b8a8-68f07bdaa89c" providerId="ADAL" clId="{A12536A5-8C6D-4C80-9542-005399029E22}" dt="2017-12-07T19:07:15.017" v="2855" actId="12788"/>
-          <ac:picMkLst>
-            <pc:docMk/>
-            <pc:sldMk cId="4272987819" sldId="1566"/>
-            <ac:picMk id="3" creationId="{0B67AAE3-6A1D-41B7-A254-99E47E0D127E}"/>
-          </ac:picMkLst>
-        </pc:picChg>
-      </pc:sldChg>
-      <pc:sldChg chg="addSp delSp modSp add">
-        <pc:chgData name="Kevin Van Hoogdalem" userId="a04451ef-be22-40ce-b8a8-68f07bdaa89c" providerId="ADAL" clId="{A12536A5-8C6D-4C80-9542-005399029E22}" dt="2017-12-07T18:48:17.689" v="2214" actId="1076"/>
-        <pc:sldMkLst>
-          <pc:docMk/>
-          <pc:sldMk cId="3092109817" sldId="1567"/>
-        </pc:sldMkLst>
-        <pc:spChg chg="mod">
-          <ac:chgData name="Kevin Van Hoogdalem" userId="a04451ef-be22-40ce-b8a8-68f07bdaa89c" providerId="ADAL" clId="{A12536A5-8C6D-4C80-9542-005399029E22}" dt="2017-12-07T18:48:09.783" v="2212" actId="20577"/>
-          <ac:spMkLst>
-            <pc:docMk/>
-            <pc:sldMk cId="3092109817" sldId="1567"/>
-            <ac:spMk id="6" creationId="{00000000-0000-0000-0000-000000000000}"/>
-          </ac:spMkLst>
-        </pc:spChg>
-        <pc:spChg chg="mod">
-          <ac:chgData name="Kevin Van Hoogdalem" userId="a04451ef-be22-40ce-b8a8-68f07bdaa89c" providerId="ADAL" clId="{A12536A5-8C6D-4C80-9542-005399029E22}" dt="2017-12-07T18:36:18.938" v="1138" actId="20577"/>
-          <ac:spMkLst>
-            <pc:docMk/>
-            <pc:sldMk cId="3092109817" sldId="1567"/>
-            <ac:spMk id="17" creationId="{00000000-0000-0000-0000-000000000000}"/>
-          </ac:spMkLst>
-        </pc:spChg>
-        <pc:picChg chg="del">
-          <ac:chgData name="Kevin Van Hoogdalem" userId="a04451ef-be22-40ce-b8a8-68f07bdaa89c" providerId="ADAL" clId="{A12536A5-8C6D-4C80-9542-005399029E22}" dt="2017-12-07T18:36:21.518" v="1139" actId="478"/>
-          <ac:picMkLst>
-            <pc:docMk/>
-            <pc:sldMk cId="3092109817" sldId="1567"/>
-            <ac:picMk id="2" creationId="{91609CEF-0C4C-4A8E-B756-65F66799A226}"/>
-          </ac:picMkLst>
-        </pc:picChg>
-        <pc:picChg chg="add del mod">
-          <ac:chgData name="Kevin Van Hoogdalem" userId="a04451ef-be22-40ce-b8a8-68f07bdaa89c" providerId="ADAL" clId="{A12536A5-8C6D-4C80-9542-005399029E22}" dt="2017-12-07T18:42:03.801" v="1476" actId="478"/>
-          <ac:picMkLst>
-            <pc:docMk/>
-            <pc:sldMk cId="3092109817" sldId="1567"/>
-            <ac:picMk id="3" creationId="{8CD43421-A4A9-4E22-A869-59A27E6F0069}"/>
-          </ac:picMkLst>
-        </pc:picChg>
-        <pc:picChg chg="add mod">
-          <ac:chgData name="Kevin Van Hoogdalem" userId="a04451ef-be22-40ce-b8a8-68f07bdaa89c" providerId="ADAL" clId="{A12536A5-8C6D-4C80-9542-005399029E22}" dt="2017-12-07T18:48:17.689" v="2214" actId="1076"/>
-          <ac:picMkLst>
-            <pc:docMk/>
-            <pc:sldMk cId="3092109817" sldId="1567"/>
-            <ac:picMk id="4" creationId="{38099582-A6AC-4658-BEB0-AADF9AEDAE3F}"/>
-          </ac:picMkLst>
-        </pc:picChg>
-      </pc:sldChg>
-      <pc:sldChg chg="addSp delSp modSp add">
-        <pc:chgData name="Kevin Van Hoogdalem" userId="a04451ef-be22-40ce-b8a8-68f07bdaa89c" providerId="ADAL" clId="{A12536A5-8C6D-4C80-9542-005399029E22}" dt="2017-12-07T19:02:22.527" v="2643" actId="20577"/>
-        <pc:sldMkLst>
-          <pc:docMk/>
-          <pc:sldMk cId="3185601111" sldId="1568"/>
-        </pc:sldMkLst>
-        <pc:spChg chg="mod">
-          <ac:chgData name="Kevin Van Hoogdalem" userId="a04451ef-be22-40ce-b8a8-68f07bdaa89c" providerId="ADAL" clId="{A12536A5-8C6D-4C80-9542-005399029E22}" dt="2017-12-07T19:02:22.527" v="2643" actId="20577"/>
-          <ac:spMkLst>
-            <pc:docMk/>
-            <pc:sldMk cId="3185601111" sldId="1568"/>
-            <ac:spMk id="6" creationId="{00000000-0000-0000-0000-000000000000}"/>
-          </ac:spMkLst>
-        </pc:spChg>
-        <pc:spChg chg="mod">
-          <ac:chgData name="Kevin Van Hoogdalem" userId="a04451ef-be22-40ce-b8a8-68f07bdaa89c" providerId="ADAL" clId="{A12536A5-8C6D-4C80-9542-005399029E22}" dt="2017-12-07T18:59:51.047" v="2245" actId="6549"/>
-          <ac:spMkLst>
-            <pc:docMk/>
-            <pc:sldMk cId="3185601111" sldId="1568"/>
-            <ac:spMk id="17" creationId="{00000000-0000-0000-0000-000000000000}"/>
-          </ac:spMkLst>
-        </pc:spChg>
-        <pc:picChg chg="add mod">
-          <ac:chgData name="Kevin Van Hoogdalem" userId="a04451ef-be22-40ce-b8a8-68f07bdaa89c" providerId="ADAL" clId="{A12536A5-8C6D-4C80-9542-005399029E22}" dt="2017-12-07T19:00:14.856" v="2254" actId="1076"/>
-          <ac:picMkLst>
-            <pc:docMk/>
-            <pc:sldMk cId="3185601111" sldId="1568"/>
-            <ac:picMk id="2" creationId="{75BB6394-65B5-4106-B56C-A2847ED5ED5B}"/>
-          </ac:picMkLst>
-        </pc:picChg>
-        <pc:picChg chg="del">
-          <ac:chgData name="Kevin Van Hoogdalem" userId="a04451ef-be22-40ce-b8a8-68f07bdaa89c" providerId="ADAL" clId="{A12536A5-8C6D-4C80-9542-005399029E22}" dt="2017-12-07T18:59:52.956" v="2246" actId="478"/>
-          <ac:picMkLst>
-            <pc:docMk/>
-            <pc:sldMk cId="3185601111" sldId="1568"/>
-            <ac:picMk id="4" creationId="{38099582-A6AC-4658-BEB0-AADF9AEDAE3F}"/>
-          </ac:picMkLst>
-        </pc:picChg>
-      </pc:sldChg>
-      <pc:sldChg chg="addSp delSp modSp add">
-        <pc:chgData name="Kevin Van Hoogdalem" userId="a04451ef-be22-40ce-b8a8-68f07bdaa89c" providerId="ADAL" clId="{A12536A5-8C6D-4C80-9542-005399029E22}" dt="2017-12-07T19:16:31.137" v="3446" actId="478"/>
-        <pc:sldMkLst>
-          <pc:docMk/>
-          <pc:sldMk cId="976386266" sldId="1569"/>
-        </pc:sldMkLst>
-        <pc:spChg chg="mod">
-          <ac:chgData name="Kevin Van Hoogdalem" userId="a04451ef-be22-40ce-b8a8-68f07bdaa89c" providerId="ADAL" clId="{A12536A5-8C6D-4C80-9542-005399029E22}" dt="2017-12-07T19:15:22.237" v="3441" actId="20577"/>
-          <ac:spMkLst>
-            <pc:docMk/>
-            <pc:sldMk cId="976386266" sldId="1569"/>
-            <ac:spMk id="6" creationId="{00000000-0000-0000-0000-000000000000}"/>
-          </ac:spMkLst>
-        </pc:spChg>
-        <pc:spChg chg="mod">
-          <ac:chgData name="Kevin Van Hoogdalem" userId="a04451ef-be22-40ce-b8a8-68f07bdaa89c" providerId="ADAL" clId="{A12536A5-8C6D-4C80-9542-005399029E22}" dt="2017-12-07T19:07:51.012" v="2905" actId="20577"/>
-          <ac:spMkLst>
-            <pc:docMk/>
-            <pc:sldMk cId="976386266" sldId="1569"/>
-            <ac:spMk id="17" creationId="{00000000-0000-0000-0000-000000000000}"/>
-          </ac:spMkLst>
-        </pc:spChg>
-        <pc:picChg chg="del">
-          <ac:chgData name="Kevin Van Hoogdalem" userId="a04451ef-be22-40ce-b8a8-68f07bdaa89c" providerId="ADAL" clId="{A12536A5-8C6D-4C80-9542-005399029E22}" dt="2017-12-07T19:07:52.911" v="2906" actId="478"/>
-          <ac:picMkLst>
-            <pc:docMk/>
-            <pc:sldMk cId="976386266" sldId="1569"/>
-            <ac:picMk id="2" creationId="{75BB6394-65B5-4106-B56C-A2847ED5ED5B}"/>
-          </ac:picMkLst>
-        </pc:picChg>
-        <pc:picChg chg="add mod">
-          <ac:chgData name="Kevin Van Hoogdalem" userId="a04451ef-be22-40ce-b8a8-68f07bdaa89c" providerId="ADAL" clId="{A12536A5-8C6D-4C80-9542-005399029E22}" dt="2017-12-07T19:15:31.207" v="3442" actId="1076"/>
-          <ac:picMkLst>
-            <pc:docMk/>
-            <pc:sldMk cId="976386266" sldId="1569"/>
-            <ac:picMk id="3" creationId="{B617B427-480F-4989-B014-E7EA476FB0CD}"/>
-          </ac:picMkLst>
-        </pc:picChg>
-        <pc:picChg chg="add del mod">
-          <ac:chgData name="Kevin Van Hoogdalem" userId="a04451ef-be22-40ce-b8a8-68f07bdaa89c" providerId="ADAL" clId="{A12536A5-8C6D-4C80-9542-005399029E22}" dt="2017-12-07T19:16:31.137" v="3446" actId="478"/>
-          <ac:picMkLst>
-            <pc:docMk/>
-            <pc:sldMk cId="976386266" sldId="1569"/>
-            <ac:picMk id="4" creationId="{5FE21127-68B4-4295-A745-2E9CA7FB2664}"/>
-          </ac:picMkLst>
-        </pc:picChg>
-      </pc:sldChg>
-      <pc:sldChg chg="addSp delSp modSp add">
-        <pc:chgData name="Kevin Van Hoogdalem" userId="a04451ef-be22-40ce-b8a8-68f07bdaa89c" providerId="ADAL" clId="{A12536A5-8C6D-4C80-9542-005399029E22}" dt="2017-12-07T19:21:29.914" v="3884" actId="1076"/>
-        <pc:sldMkLst>
-          <pc:docMk/>
-          <pc:sldMk cId="601170866" sldId="1570"/>
-        </pc:sldMkLst>
-        <pc:spChg chg="add del mod">
-          <ac:chgData name="Kevin Van Hoogdalem" userId="a04451ef-be22-40ce-b8a8-68f07bdaa89c" providerId="ADAL" clId="{A12536A5-8C6D-4C80-9542-005399029E22}" dt="2017-12-07T19:16:50.584" v="3465" actId="478"/>
-          <ac:spMkLst>
-            <pc:docMk/>
-            <pc:sldMk cId="601170866" sldId="1570"/>
-            <ac:spMk id="5" creationId="{CA0A6A49-97EA-461F-8A1B-BCC385A26B14}"/>
-          </ac:spMkLst>
-        </pc:spChg>
-        <pc:spChg chg="del">
-          <ac:chgData name="Kevin Van Hoogdalem" userId="a04451ef-be22-40ce-b8a8-68f07bdaa89c" providerId="ADAL" clId="{A12536A5-8C6D-4C80-9542-005399029E22}" dt="2017-12-07T19:16:46.010" v="3463" actId="478"/>
-          <ac:spMkLst>
-            <pc:docMk/>
-            <pc:sldMk cId="601170866" sldId="1570"/>
-            <ac:spMk id="6" creationId="{00000000-0000-0000-0000-000000000000}"/>
-          </ac:spMkLst>
-        </pc:spChg>
-        <pc:spChg chg="add mod">
-          <ac:chgData name="Kevin Van Hoogdalem" userId="a04451ef-be22-40ce-b8a8-68f07bdaa89c" providerId="ADAL" clId="{A12536A5-8C6D-4C80-9542-005399029E22}" dt="2017-12-07T19:20:38.883" v="3877" actId="20577"/>
-          <ac:spMkLst>
-            <pc:docMk/>
-            <pc:sldMk cId="601170866" sldId="1570"/>
-            <ac:spMk id="8" creationId="{92247DE7-7798-401F-95E0-531525B1C759}"/>
-          </ac:spMkLst>
-        </pc:spChg>
-        <pc:spChg chg="mod">
-          <ac:chgData name="Kevin Van Hoogdalem" userId="a04451ef-be22-40ce-b8a8-68f07bdaa89c" providerId="ADAL" clId="{A12536A5-8C6D-4C80-9542-005399029E22}" dt="2017-12-07T19:16:36.223" v="3461" actId="20577"/>
-          <ac:spMkLst>
-            <pc:docMk/>
-            <pc:sldMk cId="601170866" sldId="1570"/>
-            <ac:spMk id="17" creationId="{00000000-0000-0000-0000-000000000000}"/>
-          </ac:spMkLst>
-        </pc:spChg>
-        <pc:picChg chg="del">
-          <ac:chgData name="Kevin Van Hoogdalem" userId="a04451ef-be22-40ce-b8a8-68f07bdaa89c" providerId="ADAL" clId="{A12536A5-8C6D-4C80-9542-005399029E22}" dt="2017-12-07T19:16:38.624" v="3462" actId="478"/>
-          <ac:picMkLst>
-            <pc:docMk/>
-            <pc:sldMk cId="601170866" sldId="1570"/>
-            <ac:picMk id="3" creationId="{B617B427-480F-4989-B014-E7EA476FB0CD}"/>
-          </ac:picMkLst>
-        </pc:picChg>
-        <pc:picChg chg="mod">
-          <ac:chgData name="Kevin Van Hoogdalem" userId="a04451ef-be22-40ce-b8a8-68f07bdaa89c" providerId="ADAL" clId="{A12536A5-8C6D-4C80-9542-005399029E22}" dt="2017-12-07T19:20:32.304" v="3872" actId="1076"/>
-          <ac:picMkLst>
-            <pc:docMk/>
-            <pc:sldMk cId="601170866" sldId="1570"/>
-            <ac:picMk id="4" creationId="{5FE21127-68B4-4295-A745-2E9CA7FB2664}"/>
-          </ac:picMkLst>
-        </pc:picChg>
-        <pc:picChg chg="add mod">
-          <ac:chgData name="Kevin Van Hoogdalem" userId="a04451ef-be22-40ce-b8a8-68f07bdaa89c" providerId="ADAL" clId="{A12536A5-8C6D-4C80-9542-005399029E22}" dt="2017-12-07T19:20:29.254" v="3871" actId="1076"/>
-          <ac:picMkLst>
-            <pc:docMk/>
-            <pc:sldMk cId="601170866" sldId="1570"/>
-            <ac:picMk id="7" creationId="{DB99504A-6711-4353-AA39-35F852C9D25B}"/>
-          </ac:picMkLst>
-        </pc:picChg>
-        <pc:picChg chg="add mod">
-          <ac:chgData name="Kevin Van Hoogdalem" userId="a04451ef-be22-40ce-b8a8-68f07bdaa89c" providerId="ADAL" clId="{A12536A5-8C6D-4C80-9542-005399029E22}" dt="2017-12-07T19:21:29.914" v="3884" actId="1076"/>
-          <ac:picMkLst>
-            <pc:docMk/>
-            <pc:sldMk cId="601170866" sldId="1570"/>
-            <ac:picMk id="9" creationId="{5DD6AA63-88E2-45FC-A0C4-1673FCBAC71F}"/>
-          </ac:picMkLst>
-        </pc:picChg>
-      </pc:sldChg>
-      <pc:sldChg chg="addSp delSp modSp add">
-        <pc:chgData name="Kevin Van Hoogdalem" userId="a04451ef-be22-40ce-b8a8-68f07bdaa89c" providerId="ADAL" clId="{A12536A5-8C6D-4C80-9542-005399029E22}" dt="2017-12-07T19:25:01.264" v="4450" actId="20577"/>
-        <pc:sldMkLst>
-          <pc:docMk/>
-          <pc:sldMk cId="770852895" sldId="1571"/>
-        </pc:sldMkLst>
-        <pc:spChg chg="mod ord">
-          <ac:chgData name="Kevin Van Hoogdalem" userId="a04451ef-be22-40ce-b8a8-68f07bdaa89c" providerId="ADAL" clId="{A12536A5-8C6D-4C80-9542-005399029E22}" dt="2017-12-07T19:25:01.264" v="4450" actId="20577"/>
-          <ac:spMkLst>
-            <pc:docMk/>
-            <pc:sldMk cId="770852895" sldId="1571"/>
-            <ac:spMk id="8" creationId="{92247DE7-7798-401F-95E0-531525B1C759}"/>
-          </ac:spMkLst>
-        </pc:spChg>
-        <pc:spChg chg="mod">
-          <ac:chgData name="Kevin Van Hoogdalem" userId="a04451ef-be22-40ce-b8a8-68f07bdaa89c" providerId="ADAL" clId="{A12536A5-8C6D-4C80-9542-005399029E22}" dt="2017-12-07T19:21:38.817" v="3917" actId="20577"/>
-          <ac:spMkLst>
-            <pc:docMk/>
-            <pc:sldMk cId="770852895" sldId="1571"/>
-            <ac:spMk id="17" creationId="{00000000-0000-0000-0000-000000000000}"/>
-          </ac:spMkLst>
-        </pc:spChg>
-        <pc:picChg chg="add mod">
-          <ac:chgData name="Kevin Van Hoogdalem" userId="a04451ef-be22-40ce-b8a8-68f07bdaa89c" providerId="ADAL" clId="{A12536A5-8C6D-4C80-9542-005399029E22}" dt="2017-12-07T19:22:25.493" v="3925" actId="1076"/>
-          <ac:picMkLst>
-            <pc:docMk/>
-            <pc:sldMk cId="770852895" sldId="1571"/>
-            <ac:picMk id="2" creationId="{CA9B3C4B-D210-4226-8E20-DE2725277EE5}"/>
-          </ac:picMkLst>
-        </pc:picChg>
-        <pc:picChg chg="del">
-          <ac:chgData name="Kevin Van Hoogdalem" userId="a04451ef-be22-40ce-b8a8-68f07bdaa89c" providerId="ADAL" clId="{A12536A5-8C6D-4C80-9542-005399029E22}" dt="2017-12-07T19:21:48.824" v="3919" actId="478"/>
-          <ac:picMkLst>
-            <pc:docMk/>
-            <pc:sldMk cId="770852895" sldId="1571"/>
-            <ac:picMk id="4" creationId="{5FE21127-68B4-4295-A745-2E9CA7FB2664}"/>
-          </ac:picMkLst>
-        </pc:picChg>
-        <pc:picChg chg="del">
-          <ac:chgData name="Kevin Van Hoogdalem" userId="a04451ef-be22-40ce-b8a8-68f07bdaa89c" providerId="ADAL" clId="{A12536A5-8C6D-4C80-9542-005399029E22}" dt="2017-12-07T19:21:48.824" v="3919" actId="478"/>
-          <ac:picMkLst>
-            <pc:docMk/>
-            <pc:sldMk cId="770852895" sldId="1571"/>
-            <ac:picMk id="7" creationId="{DB99504A-6711-4353-AA39-35F852C9D25B}"/>
-          </ac:picMkLst>
-        </pc:picChg>
-        <pc:picChg chg="mod">
-          <ac:chgData name="Kevin Van Hoogdalem" userId="a04451ef-be22-40ce-b8a8-68f07bdaa89c" providerId="ADAL" clId="{A12536A5-8C6D-4C80-9542-005399029E22}" dt="2017-12-07T19:22:23.053" v="3924" actId="1076"/>
-          <ac:picMkLst>
-            <pc:docMk/>
-            <pc:sldMk cId="770852895" sldId="1571"/>
-            <ac:picMk id="9" creationId="{5DD6AA63-88E2-45FC-A0C4-1673FCBAC71F}"/>
-          </ac:picMkLst>
-        </pc:picChg>
-      </pc:sldChg>
-      <pc:sldChg chg="addSp delSp modSp add">
-        <pc:chgData name="Kevin Van Hoogdalem" userId="a04451ef-be22-40ce-b8a8-68f07bdaa89c" providerId="ADAL" clId="{A12536A5-8C6D-4C80-9542-005399029E22}" dt="2017-12-07T19:31:59.569" v="5124" actId="255"/>
-        <pc:sldMkLst>
-          <pc:docMk/>
-          <pc:sldMk cId="9812839" sldId="1572"/>
-        </pc:sldMkLst>
-        <pc:spChg chg="mod">
-          <ac:chgData name="Kevin Van Hoogdalem" userId="a04451ef-be22-40ce-b8a8-68f07bdaa89c" providerId="ADAL" clId="{A12536A5-8C6D-4C80-9542-005399029E22}" dt="2017-12-07T19:27:57.052" v="4687" actId="20577"/>
-          <ac:spMkLst>
-            <pc:docMk/>
-            <pc:sldMk cId="9812839" sldId="1572"/>
-            <ac:spMk id="6" creationId="{00000000-0000-0000-0000-000000000000}"/>
-          </ac:spMkLst>
-        </pc:spChg>
-        <pc:spChg chg="add mod">
-          <ac:chgData name="Kevin Van Hoogdalem" userId="a04451ef-be22-40ce-b8a8-68f07bdaa89c" providerId="ADAL" clId="{A12536A5-8C6D-4C80-9542-005399029E22}" dt="2017-12-07T19:31:59.569" v="5124" actId="255"/>
-          <ac:spMkLst>
-            <pc:docMk/>
-            <pc:sldMk cId="9812839" sldId="1572"/>
-            <ac:spMk id="11" creationId="{1F6DAF70-8021-4C74-B17A-C600BA874B9F}"/>
-          </ac:spMkLst>
-        </pc:spChg>
-        <pc:spChg chg="mod">
-          <ac:chgData name="Kevin Van Hoogdalem" userId="a04451ef-be22-40ce-b8a8-68f07bdaa89c" providerId="ADAL" clId="{A12536A5-8C6D-4C80-9542-005399029E22}" dt="2017-12-07T19:25:29.806" v="4466" actId="20577"/>
-          <ac:spMkLst>
-            <pc:docMk/>
-            <pc:sldMk cId="9812839" sldId="1572"/>
-            <ac:spMk id="17" creationId="{00000000-0000-0000-0000-000000000000}"/>
-          </ac:spMkLst>
-        </pc:spChg>
-        <pc:picChg chg="add del mod">
-          <ac:chgData name="Kevin Van Hoogdalem" userId="a04451ef-be22-40ce-b8a8-68f07bdaa89c" providerId="ADAL" clId="{A12536A5-8C6D-4C80-9542-005399029E22}" dt="2017-12-07T19:29:39.850" v="4844" actId="478"/>
-          <ac:picMkLst>
-            <pc:docMk/>
-            <pc:sldMk cId="9812839" sldId="1572"/>
-            <ac:picMk id="2" creationId="{743BD2F1-F278-47DB-9201-C2394355C1DF}"/>
-          </ac:picMkLst>
-        </pc:picChg>
-        <pc:picChg chg="del">
-          <ac:chgData name="Kevin Van Hoogdalem" userId="a04451ef-be22-40ce-b8a8-68f07bdaa89c" providerId="ADAL" clId="{A12536A5-8C6D-4C80-9542-005399029E22}" dt="2017-12-07T19:25:42.325" v="4467" actId="478"/>
-          <ac:picMkLst>
-            <pc:docMk/>
-            <pc:sldMk cId="9812839" sldId="1572"/>
-            <ac:picMk id="3" creationId="{9E962D96-0C76-44AE-9A4B-96A714689099}"/>
-          </ac:picMkLst>
-        </pc:picChg>
-        <pc:picChg chg="del">
-          <ac:chgData name="Kevin Van Hoogdalem" userId="a04451ef-be22-40ce-b8a8-68f07bdaa89c" providerId="ADAL" clId="{A12536A5-8C6D-4C80-9542-005399029E22}" dt="2017-12-07T19:25:42.325" v="4467" actId="478"/>
-          <ac:picMkLst>
-            <pc:docMk/>
-            <pc:sldMk cId="9812839" sldId="1572"/>
-            <ac:picMk id="4" creationId="{4BE7CB89-3A40-4C5F-942D-2A8AE6045099}"/>
-          </ac:picMkLst>
-        </pc:picChg>
-        <pc:picChg chg="add mod">
-          <ac:chgData name="Kevin Van Hoogdalem" userId="a04451ef-be22-40ce-b8a8-68f07bdaa89c" providerId="ADAL" clId="{A12536A5-8C6D-4C80-9542-005399029E22}" dt="2017-12-07T19:29:44.965" v="4848" actId="1076"/>
-          <ac:picMkLst>
-            <pc:docMk/>
-            <pc:sldMk cId="9812839" sldId="1572"/>
-            <ac:picMk id="5" creationId="{8143E6B7-4AE9-40F3-B1DF-41B4F34B6571}"/>
-          </ac:picMkLst>
-        </pc:picChg>
-        <pc:picChg chg="del">
-          <ac:chgData name="Kevin Van Hoogdalem" userId="a04451ef-be22-40ce-b8a8-68f07bdaa89c" providerId="ADAL" clId="{A12536A5-8C6D-4C80-9542-005399029E22}" dt="2017-12-07T19:25:42.325" v="4467" actId="478"/>
-          <ac:picMkLst>
-            <pc:docMk/>
-            <pc:sldMk cId="9812839" sldId="1572"/>
-            <ac:picMk id="9" creationId="{3026057A-0636-429C-98F8-E341C6423E94}"/>
-          </ac:picMkLst>
-        </pc:picChg>
-        <pc:picChg chg="del">
-          <ac:chgData name="Kevin Van Hoogdalem" userId="a04451ef-be22-40ce-b8a8-68f07bdaa89c" providerId="ADAL" clId="{A12536A5-8C6D-4C80-9542-005399029E22}" dt="2017-12-07T19:25:42.325" v="4467" actId="478"/>
-          <ac:picMkLst>
-            <pc:docMk/>
-            <pc:sldMk cId="9812839" sldId="1572"/>
-            <ac:picMk id="10" creationId="{9C888A9E-9DFC-4AE2-B2CF-FF12D47BD44A}"/>
-          </ac:picMkLst>
-        </pc:picChg>
-      </pc:sldChg>
-    </pc:docChg>
-  </pc:docChgLst>
   <pc:docChgLst>
     <pc:chgData name="Kevin Van Hoogdalem" userId="a04451ef-be22-40ce-b8a8-68f07bdaa89c" providerId="ADAL" clId="{02DBE718-EB70-403E-B251-FE175B53CF5F}"/>
     <pc:docChg chg="undo custSel addSld delSld modSld delSection">
@@ -1616,6 +993,627 @@
       </pc:sldChg>
     </pc:docChg>
   </pc:docChgLst>
+  <pc:docChgLst>
+    <pc:chgData name="Kevin Van Hoogdalem" userId="a04451ef-be22-40ce-b8a8-68f07bdaa89c" providerId="ADAL" clId="{A12536A5-8C6D-4C80-9542-005399029E22}"/>
+    <pc:docChg chg="custSel addSld delSld modSld">
+      <pc:chgData name="Kevin Van Hoogdalem" userId="a04451ef-be22-40ce-b8a8-68f07bdaa89c" providerId="ADAL" clId="{A12536A5-8C6D-4C80-9542-005399029E22}" dt="2017-12-07T19:31:59.569" v="5124" actId="255"/>
+      <pc:docMkLst>
+        <pc:docMk/>
+      </pc:docMkLst>
+      <pc:sldChg chg="modSp">
+        <pc:chgData name="Kevin Van Hoogdalem" userId="a04451ef-be22-40ce-b8a8-68f07bdaa89c" providerId="ADAL" clId="{A12536A5-8C6D-4C80-9542-005399029E22}" dt="2017-12-07T18:11:00.031" v="228" actId="20577"/>
+        <pc:sldMkLst>
+          <pc:docMk/>
+          <pc:sldMk cId="4132783674" sldId="1551"/>
+        </pc:sldMkLst>
+        <pc:spChg chg="mod">
+          <ac:chgData name="Kevin Van Hoogdalem" userId="a04451ef-be22-40ce-b8a8-68f07bdaa89c" providerId="ADAL" clId="{A12536A5-8C6D-4C80-9542-005399029E22}" dt="2017-12-07T18:11:00.031" v="228" actId="20577"/>
+          <ac:spMkLst>
+            <pc:docMk/>
+            <pc:sldMk cId="4132783674" sldId="1551"/>
+            <ac:spMk id="6" creationId="{00000000-0000-0000-0000-000000000000}"/>
+          </ac:spMkLst>
+        </pc:spChg>
+      </pc:sldChg>
+      <pc:sldChg chg="addSp delSp modSp">
+        <pc:chgData name="Kevin Van Hoogdalem" userId="a04451ef-be22-40ce-b8a8-68f07bdaa89c" providerId="ADAL" clId="{A12536A5-8C6D-4C80-9542-005399029E22}" dt="2017-12-07T02:41:46.452" v="9" actId="478"/>
+        <pc:sldMkLst>
+          <pc:docMk/>
+          <pc:sldMk cId="4145435315" sldId="1562"/>
+        </pc:sldMkLst>
+        <pc:picChg chg="del">
+          <ac:chgData name="Kevin Van Hoogdalem" userId="a04451ef-be22-40ce-b8a8-68f07bdaa89c" providerId="ADAL" clId="{A12536A5-8C6D-4C80-9542-005399029E22}" dt="2017-12-07T02:41:46.452" v="9" actId="478"/>
+          <ac:picMkLst>
+            <pc:docMk/>
+            <pc:sldMk cId="4145435315" sldId="1562"/>
+            <ac:picMk id="2" creationId="{1D29B1F1-1444-4AED-B758-2AE113B6973B}"/>
+          </ac:picMkLst>
+        </pc:picChg>
+        <pc:picChg chg="add del mod">
+          <ac:chgData name="Kevin Van Hoogdalem" userId="a04451ef-be22-40ce-b8a8-68f07bdaa89c" providerId="ADAL" clId="{A12536A5-8C6D-4C80-9542-005399029E22}" dt="2017-12-07T02:39:52.849" v="5" actId="478"/>
+          <ac:picMkLst>
+            <pc:docMk/>
+            <pc:sldMk cId="4145435315" sldId="1562"/>
+            <ac:picMk id="3" creationId="{BBBF619B-069D-4C8D-A9AE-F6E911112DE2}"/>
+          </ac:picMkLst>
+        </pc:picChg>
+        <pc:picChg chg="add del mod">
+          <ac:chgData name="Kevin Van Hoogdalem" userId="a04451ef-be22-40ce-b8a8-68f07bdaa89c" providerId="ADAL" clId="{A12536A5-8C6D-4C80-9542-005399029E22}" dt="2017-12-07T02:41:46.452" v="9" actId="478"/>
+          <ac:picMkLst>
+            <pc:docMk/>
+            <pc:sldMk cId="4145435315" sldId="1562"/>
+            <ac:picMk id="4" creationId="{B759BB42-DF39-4146-9E68-D0452F93A3CD}"/>
+          </ac:picMkLst>
+        </pc:picChg>
+        <pc:picChg chg="add del mod">
+          <ac:chgData name="Kevin Van Hoogdalem" userId="a04451ef-be22-40ce-b8a8-68f07bdaa89c" providerId="ADAL" clId="{A12536A5-8C6D-4C80-9542-005399029E22}" dt="2017-12-07T02:41:46.452" v="9" actId="478"/>
+          <ac:picMkLst>
+            <pc:docMk/>
+            <pc:sldMk cId="4145435315" sldId="1562"/>
+            <ac:picMk id="5" creationId="{514F5E60-C1DD-40E5-8E28-5C537C0DB355}"/>
+          </ac:picMkLst>
+        </pc:picChg>
+      </pc:sldChg>
+      <pc:sldChg chg="delSp modSp add">
+        <pc:chgData name="Kevin Van Hoogdalem" userId="a04451ef-be22-40ce-b8a8-68f07bdaa89c" providerId="ADAL" clId="{A12536A5-8C6D-4C80-9542-005399029E22}" dt="2017-12-07T02:42:15.200" v="29" actId="20577"/>
+        <pc:sldMkLst>
+          <pc:docMk/>
+          <pc:sldMk cId="2257676999" sldId="1563"/>
+        </pc:sldMkLst>
+        <pc:spChg chg="mod">
+          <ac:chgData name="Kevin Van Hoogdalem" userId="a04451ef-be22-40ce-b8a8-68f07bdaa89c" providerId="ADAL" clId="{A12536A5-8C6D-4C80-9542-005399029E22}" dt="2017-12-07T02:42:15.200" v="29" actId="20577"/>
+          <ac:spMkLst>
+            <pc:docMk/>
+            <pc:sldMk cId="2257676999" sldId="1563"/>
+            <ac:spMk id="17" creationId="{00000000-0000-0000-0000-000000000000}"/>
+          </ac:spMkLst>
+        </pc:spChg>
+        <pc:picChg chg="del">
+          <ac:chgData name="Kevin Van Hoogdalem" userId="a04451ef-be22-40ce-b8a8-68f07bdaa89c" providerId="ADAL" clId="{A12536A5-8C6D-4C80-9542-005399029E22}" dt="2017-12-07T02:42:06.967" v="19" actId="20577"/>
+          <ac:picMkLst>
+            <pc:docMk/>
+            <pc:sldMk cId="2257676999" sldId="1563"/>
+            <ac:picMk id="2" creationId="{1D29B1F1-1444-4AED-B758-2AE113B6973B}"/>
+          </ac:picMkLst>
+        </pc:picChg>
+        <pc:picChg chg="del">
+          <ac:chgData name="Kevin Van Hoogdalem" userId="a04451ef-be22-40ce-b8a8-68f07bdaa89c" providerId="ADAL" clId="{A12536A5-8C6D-4C80-9542-005399029E22}" dt="2017-12-07T02:42:06.967" v="19" actId="20577"/>
+          <ac:picMkLst>
+            <pc:docMk/>
+            <pc:sldMk cId="2257676999" sldId="1563"/>
+            <ac:picMk id="4" creationId="{B759BB42-DF39-4146-9E68-D0452F93A3CD}"/>
+          </ac:picMkLst>
+        </pc:picChg>
+        <pc:picChg chg="del">
+          <ac:chgData name="Kevin Van Hoogdalem" userId="a04451ef-be22-40ce-b8a8-68f07bdaa89c" providerId="ADAL" clId="{A12536A5-8C6D-4C80-9542-005399029E22}" dt="2017-12-07T02:42:06.967" v="19" actId="20577"/>
+          <ac:picMkLst>
+            <pc:docMk/>
+            <pc:sldMk cId="2257676999" sldId="1563"/>
+            <ac:picMk id="5" creationId="{514F5E60-C1DD-40E5-8E28-5C537C0DB355}"/>
+          </ac:picMkLst>
+        </pc:picChg>
+      </pc:sldChg>
+      <pc:sldChg chg="addSp delSp modSp add">
+        <pc:chgData name="Kevin Van Hoogdalem" userId="a04451ef-be22-40ce-b8a8-68f07bdaa89c" providerId="ADAL" clId="{A12536A5-8C6D-4C80-9542-005399029E22}" dt="2017-12-07T04:14:18.787" v="216" actId="20577"/>
+        <pc:sldMkLst>
+          <pc:docMk/>
+          <pc:sldMk cId="747649839" sldId="1564"/>
+        </pc:sldMkLst>
+        <pc:spChg chg="mod">
+          <ac:chgData name="Kevin Van Hoogdalem" userId="a04451ef-be22-40ce-b8a8-68f07bdaa89c" providerId="ADAL" clId="{A12536A5-8C6D-4C80-9542-005399029E22}" dt="2017-12-07T04:14:18.787" v="216" actId="20577"/>
+          <ac:spMkLst>
+            <pc:docMk/>
+            <pc:sldMk cId="747649839" sldId="1564"/>
+            <ac:spMk id="6" creationId="{00000000-0000-0000-0000-000000000000}"/>
+          </ac:spMkLst>
+        </pc:spChg>
+        <pc:spChg chg="del">
+          <ac:chgData name="Kevin Van Hoogdalem" userId="a04451ef-be22-40ce-b8a8-68f07bdaa89c" providerId="ADAL" clId="{A12536A5-8C6D-4C80-9542-005399029E22}" dt="2017-12-07T02:41:58.624" v="11" actId="478"/>
+          <ac:spMkLst>
+            <pc:docMk/>
+            <pc:sldMk cId="747649839" sldId="1564"/>
+            <ac:spMk id="7" creationId="{3C94AF72-E908-4C98-868A-0E5BF3818ABB}"/>
+          </ac:spMkLst>
+        </pc:spChg>
+        <pc:spChg chg="mod">
+          <ac:chgData name="Kevin Van Hoogdalem" userId="a04451ef-be22-40ce-b8a8-68f07bdaa89c" providerId="ADAL" clId="{A12536A5-8C6D-4C80-9542-005399029E22}" dt="2017-12-07T02:42:02.569" v="18" actId="20577"/>
+          <ac:spMkLst>
+            <pc:docMk/>
+            <pc:sldMk cId="747649839" sldId="1564"/>
+            <ac:spMk id="17" creationId="{00000000-0000-0000-0000-000000000000}"/>
+          </ac:spMkLst>
+        </pc:spChg>
+        <pc:picChg chg="del">
+          <ac:chgData name="Kevin Van Hoogdalem" userId="a04451ef-be22-40ce-b8a8-68f07bdaa89c" providerId="ADAL" clId="{A12536A5-8C6D-4C80-9542-005399029E22}" dt="2017-12-07T02:41:58.624" v="11" actId="478"/>
+          <ac:picMkLst>
+            <pc:docMk/>
+            <pc:sldMk cId="747649839" sldId="1564"/>
+            <ac:picMk id="2" creationId="{A5EA68D1-274B-4444-A4E9-6956056F52A0}"/>
+          </ac:picMkLst>
+        </pc:picChg>
+        <pc:picChg chg="add mod">
+          <ac:chgData name="Kevin Van Hoogdalem" userId="a04451ef-be22-40ce-b8a8-68f07bdaa89c" providerId="ADAL" clId="{A12536A5-8C6D-4C80-9542-005399029E22}" dt="2017-12-07T04:05:20.230" v="191" actId="1076"/>
+          <ac:picMkLst>
+            <pc:docMk/>
+            <pc:sldMk cId="747649839" sldId="1564"/>
+            <ac:picMk id="3" creationId="{9E962D96-0C76-44AE-9A4B-96A714689099}"/>
+          </ac:picMkLst>
+        </pc:picChg>
+        <pc:picChg chg="add mod">
+          <ac:chgData name="Kevin Van Hoogdalem" userId="a04451ef-be22-40ce-b8a8-68f07bdaa89c" providerId="ADAL" clId="{A12536A5-8C6D-4C80-9542-005399029E22}" dt="2017-12-07T04:05:21.793" v="192" actId="1076"/>
+          <ac:picMkLst>
+            <pc:docMk/>
+            <pc:sldMk cId="747649839" sldId="1564"/>
+            <ac:picMk id="4" creationId="{4BE7CB89-3A40-4C5F-942D-2A8AE6045099}"/>
+          </ac:picMkLst>
+        </pc:picChg>
+        <pc:picChg chg="add del mod">
+          <ac:chgData name="Kevin Van Hoogdalem" userId="a04451ef-be22-40ce-b8a8-68f07bdaa89c" providerId="ADAL" clId="{A12536A5-8C6D-4C80-9542-005399029E22}" dt="2017-12-07T02:42:25.876" v="32" actId="478"/>
+          <ac:picMkLst>
+            <pc:docMk/>
+            <pc:sldMk cId="747649839" sldId="1564"/>
+            <ac:picMk id="8" creationId="{5E8C6351-1BEE-4EFB-897C-269480DB04B1}"/>
+          </ac:picMkLst>
+        </pc:picChg>
+        <pc:picChg chg="add mod">
+          <ac:chgData name="Kevin Van Hoogdalem" userId="a04451ef-be22-40ce-b8a8-68f07bdaa89c" providerId="ADAL" clId="{A12536A5-8C6D-4C80-9542-005399029E22}" dt="2017-12-07T03:00:15.568" v="151" actId="1076"/>
+          <ac:picMkLst>
+            <pc:docMk/>
+            <pc:sldMk cId="747649839" sldId="1564"/>
+            <ac:picMk id="9" creationId="{3026057A-0636-429C-98F8-E341C6423E94}"/>
+          </ac:picMkLst>
+        </pc:picChg>
+        <pc:picChg chg="add mod">
+          <ac:chgData name="Kevin Van Hoogdalem" userId="a04451ef-be22-40ce-b8a8-68f07bdaa89c" providerId="ADAL" clId="{A12536A5-8C6D-4C80-9542-005399029E22}" dt="2017-12-07T03:00:08.116" v="148" actId="1076"/>
+          <ac:picMkLst>
+            <pc:docMk/>
+            <pc:sldMk cId="747649839" sldId="1564"/>
+            <ac:picMk id="10" creationId="{9C888A9E-9DFC-4AE2-B2CF-FF12D47BD44A}"/>
+          </ac:picMkLst>
+        </pc:picChg>
+      </pc:sldChg>
+      <pc:sldChg chg="delSp modSp add del">
+        <pc:chgData name="Kevin Van Hoogdalem" userId="a04451ef-be22-40ce-b8a8-68f07bdaa89c" providerId="ADAL" clId="{A12536A5-8C6D-4C80-9542-005399029E22}" dt="2017-12-07T19:10:51.733" v="2910" actId="2696"/>
+        <pc:sldMkLst>
+          <pc:docMk/>
+          <pc:sldMk cId="3455608382" sldId="1565"/>
+        </pc:sldMkLst>
+        <pc:spChg chg="mod">
+          <ac:chgData name="Kevin Van Hoogdalem" userId="a04451ef-be22-40ce-b8a8-68f07bdaa89c" providerId="ADAL" clId="{A12536A5-8C6D-4C80-9542-005399029E22}" dt="2017-12-07T18:32:42.853" v="952" actId="20577"/>
+          <ac:spMkLst>
+            <pc:docMk/>
+            <pc:sldMk cId="3455608382" sldId="1565"/>
+            <ac:spMk id="6" creationId="{00000000-0000-0000-0000-000000000000}"/>
+          </ac:spMkLst>
+        </pc:spChg>
+        <pc:spChg chg="del">
+          <ac:chgData name="Kevin Van Hoogdalem" userId="a04451ef-be22-40ce-b8a8-68f07bdaa89c" providerId="ADAL" clId="{A12536A5-8C6D-4C80-9542-005399029E22}" dt="2017-12-07T18:16:19.078" v="456" actId="478"/>
+          <ac:spMkLst>
+            <pc:docMk/>
+            <pc:sldMk cId="3455608382" sldId="1565"/>
+            <ac:spMk id="7" creationId="{3C94AF72-E908-4C98-868A-0E5BF3818ABB}"/>
+          </ac:spMkLst>
+        </pc:spChg>
+        <pc:spChg chg="del">
+          <ac:chgData name="Kevin Van Hoogdalem" userId="a04451ef-be22-40ce-b8a8-68f07bdaa89c" providerId="ADAL" clId="{A12536A5-8C6D-4C80-9542-005399029E22}" dt="2017-12-07T18:16:31.230" v="458" actId="478"/>
+          <ac:spMkLst>
+            <pc:docMk/>
+            <pc:sldMk cId="3455608382" sldId="1565"/>
+            <ac:spMk id="8" creationId="{D2CD71FB-2D65-4ABB-A28F-182CF5178FCE}"/>
+          </ac:spMkLst>
+        </pc:spChg>
+        <pc:spChg chg="mod">
+          <ac:chgData name="Kevin Van Hoogdalem" userId="a04451ef-be22-40ce-b8a8-68f07bdaa89c" providerId="ADAL" clId="{A12536A5-8C6D-4C80-9542-005399029E22}" dt="2017-12-07T18:14:16.649" v="247" actId="20577"/>
+          <ac:spMkLst>
+            <pc:docMk/>
+            <pc:sldMk cId="3455608382" sldId="1565"/>
+            <ac:spMk id="17" creationId="{00000000-0000-0000-0000-000000000000}"/>
+          </ac:spMkLst>
+        </pc:spChg>
+        <pc:picChg chg="del">
+          <ac:chgData name="Kevin Van Hoogdalem" userId="a04451ef-be22-40ce-b8a8-68f07bdaa89c" providerId="ADAL" clId="{A12536A5-8C6D-4C80-9542-005399029E22}" dt="2017-12-07T18:16:28.714" v="457" actId="478"/>
+          <ac:picMkLst>
+            <pc:docMk/>
+            <pc:sldMk cId="3455608382" sldId="1565"/>
+            <ac:picMk id="3" creationId="{475F5D8C-D4F5-4C6A-8AAC-6E09E46BFE46}"/>
+          </ac:picMkLst>
+        </pc:picChg>
+        <pc:picChg chg="del">
+          <ac:chgData name="Kevin Van Hoogdalem" userId="a04451ef-be22-40ce-b8a8-68f07bdaa89c" providerId="ADAL" clId="{A12536A5-8C6D-4C80-9542-005399029E22}" dt="2017-12-07T18:16:19.078" v="456" actId="478"/>
+          <ac:picMkLst>
+            <pc:docMk/>
+            <pc:sldMk cId="3455608382" sldId="1565"/>
+            <ac:picMk id="4" creationId="{822C3552-8664-4E04-88B9-7C6E9BFC42A4}"/>
+          </ac:picMkLst>
+        </pc:picChg>
+        <pc:picChg chg="del">
+          <ac:chgData name="Kevin Van Hoogdalem" userId="a04451ef-be22-40ce-b8a8-68f07bdaa89c" providerId="ADAL" clId="{A12536A5-8C6D-4C80-9542-005399029E22}" dt="2017-12-07T18:16:19.078" v="456" actId="478"/>
+          <ac:picMkLst>
+            <pc:docMk/>
+            <pc:sldMk cId="3455608382" sldId="1565"/>
+            <ac:picMk id="5" creationId="{22D2DDE6-3531-4A8E-9F0E-23B434511D28}"/>
+          </ac:picMkLst>
+        </pc:picChg>
+      </pc:sldChg>
+      <pc:sldChg chg="addSp modSp add">
+        <pc:chgData name="Kevin Van Hoogdalem" userId="a04451ef-be22-40ce-b8a8-68f07bdaa89c" providerId="ADAL" clId="{A12536A5-8C6D-4C80-9542-005399029E22}" dt="2017-12-07T19:11:10.135" v="2947" actId="20577"/>
+        <pc:sldMkLst>
+          <pc:docMk/>
+          <pc:sldMk cId="4272987819" sldId="1566"/>
+        </pc:sldMkLst>
+        <pc:spChg chg="mod">
+          <ac:chgData name="Kevin Van Hoogdalem" userId="a04451ef-be22-40ce-b8a8-68f07bdaa89c" providerId="ADAL" clId="{A12536A5-8C6D-4C80-9542-005399029E22}" dt="2017-12-07T19:07:02.175" v="2852" actId="6549"/>
+          <ac:spMkLst>
+            <pc:docMk/>
+            <pc:sldMk cId="4272987819" sldId="1566"/>
+            <ac:spMk id="6" creationId="{00000000-0000-0000-0000-000000000000}"/>
+          </ac:spMkLst>
+        </pc:spChg>
+        <pc:spChg chg="mod">
+          <ac:chgData name="Kevin Van Hoogdalem" userId="a04451ef-be22-40ce-b8a8-68f07bdaa89c" providerId="ADAL" clId="{A12536A5-8C6D-4C80-9542-005399029E22}" dt="2017-12-07T19:11:10.135" v="2947" actId="20577"/>
+          <ac:spMkLst>
+            <pc:docMk/>
+            <pc:sldMk cId="4272987819" sldId="1566"/>
+            <ac:spMk id="17" creationId="{00000000-0000-0000-0000-000000000000}"/>
+          </ac:spMkLst>
+        </pc:spChg>
+        <pc:picChg chg="add mod">
+          <ac:chgData name="Kevin Van Hoogdalem" userId="a04451ef-be22-40ce-b8a8-68f07bdaa89c" providerId="ADAL" clId="{A12536A5-8C6D-4C80-9542-005399029E22}" dt="2017-12-07T19:07:15.017" v="2855" actId="12788"/>
+          <ac:picMkLst>
+            <pc:docMk/>
+            <pc:sldMk cId="4272987819" sldId="1566"/>
+            <ac:picMk id="2" creationId="{91609CEF-0C4C-4A8E-B756-65F66799A226}"/>
+          </ac:picMkLst>
+        </pc:picChg>
+        <pc:picChg chg="add mod">
+          <ac:chgData name="Kevin Van Hoogdalem" userId="a04451ef-be22-40ce-b8a8-68f07bdaa89c" providerId="ADAL" clId="{A12536A5-8C6D-4C80-9542-005399029E22}" dt="2017-12-07T19:07:15.017" v="2855" actId="12788"/>
+          <ac:picMkLst>
+            <pc:docMk/>
+            <pc:sldMk cId="4272987819" sldId="1566"/>
+            <ac:picMk id="3" creationId="{0B67AAE3-6A1D-41B7-A254-99E47E0D127E}"/>
+          </ac:picMkLst>
+        </pc:picChg>
+      </pc:sldChg>
+      <pc:sldChg chg="addSp delSp modSp add">
+        <pc:chgData name="Kevin Van Hoogdalem" userId="a04451ef-be22-40ce-b8a8-68f07bdaa89c" providerId="ADAL" clId="{A12536A5-8C6D-4C80-9542-005399029E22}" dt="2017-12-07T18:48:17.689" v="2214" actId="1076"/>
+        <pc:sldMkLst>
+          <pc:docMk/>
+          <pc:sldMk cId="3092109817" sldId="1567"/>
+        </pc:sldMkLst>
+        <pc:spChg chg="mod">
+          <ac:chgData name="Kevin Van Hoogdalem" userId="a04451ef-be22-40ce-b8a8-68f07bdaa89c" providerId="ADAL" clId="{A12536A5-8C6D-4C80-9542-005399029E22}" dt="2017-12-07T18:48:09.783" v="2212" actId="20577"/>
+          <ac:spMkLst>
+            <pc:docMk/>
+            <pc:sldMk cId="3092109817" sldId="1567"/>
+            <ac:spMk id="6" creationId="{00000000-0000-0000-0000-000000000000}"/>
+          </ac:spMkLst>
+        </pc:spChg>
+        <pc:spChg chg="mod">
+          <ac:chgData name="Kevin Van Hoogdalem" userId="a04451ef-be22-40ce-b8a8-68f07bdaa89c" providerId="ADAL" clId="{A12536A5-8C6D-4C80-9542-005399029E22}" dt="2017-12-07T18:36:18.938" v="1138" actId="20577"/>
+          <ac:spMkLst>
+            <pc:docMk/>
+            <pc:sldMk cId="3092109817" sldId="1567"/>
+            <ac:spMk id="17" creationId="{00000000-0000-0000-0000-000000000000}"/>
+          </ac:spMkLst>
+        </pc:spChg>
+        <pc:picChg chg="del">
+          <ac:chgData name="Kevin Van Hoogdalem" userId="a04451ef-be22-40ce-b8a8-68f07bdaa89c" providerId="ADAL" clId="{A12536A5-8C6D-4C80-9542-005399029E22}" dt="2017-12-07T18:36:21.518" v="1139" actId="478"/>
+          <ac:picMkLst>
+            <pc:docMk/>
+            <pc:sldMk cId="3092109817" sldId="1567"/>
+            <ac:picMk id="2" creationId="{91609CEF-0C4C-4A8E-B756-65F66799A226}"/>
+          </ac:picMkLst>
+        </pc:picChg>
+        <pc:picChg chg="add del mod">
+          <ac:chgData name="Kevin Van Hoogdalem" userId="a04451ef-be22-40ce-b8a8-68f07bdaa89c" providerId="ADAL" clId="{A12536A5-8C6D-4C80-9542-005399029E22}" dt="2017-12-07T18:42:03.801" v="1476" actId="478"/>
+          <ac:picMkLst>
+            <pc:docMk/>
+            <pc:sldMk cId="3092109817" sldId="1567"/>
+            <ac:picMk id="3" creationId="{8CD43421-A4A9-4E22-A869-59A27E6F0069}"/>
+          </ac:picMkLst>
+        </pc:picChg>
+        <pc:picChg chg="add mod">
+          <ac:chgData name="Kevin Van Hoogdalem" userId="a04451ef-be22-40ce-b8a8-68f07bdaa89c" providerId="ADAL" clId="{A12536A5-8C6D-4C80-9542-005399029E22}" dt="2017-12-07T18:48:17.689" v="2214" actId="1076"/>
+          <ac:picMkLst>
+            <pc:docMk/>
+            <pc:sldMk cId="3092109817" sldId="1567"/>
+            <ac:picMk id="4" creationId="{38099582-A6AC-4658-BEB0-AADF9AEDAE3F}"/>
+          </ac:picMkLst>
+        </pc:picChg>
+      </pc:sldChg>
+      <pc:sldChg chg="addSp delSp modSp add">
+        <pc:chgData name="Kevin Van Hoogdalem" userId="a04451ef-be22-40ce-b8a8-68f07bdaa89c" providerId="ADAL" clId="{A12536A5-8C6D-4C80-9542-005399029E22}" dt="2017-12-07T19:02:22.527" v="2643" actId="20577"/>
+        <pc:sldMkLst>
+          <pc:docMk/>
+          <pc:sldMk cId="3185601111" sldId="1568"/>
+        </pc:sldMkLst>
+        <pc:spChg chg="mod">
+          <ac:chgData name="Kevin Van Hoogdalem" userId="a04451ef-be22-40ce-b8a8-68f07bdaa89c" providerId="ADAL" clId="{A12536A5-8C6D-4C80-9542-005399029E22}" dt="2017-12-07T19:02:22.527" v="2643" actId="20577"/>
+          <ac:spMkLst>
+            <pc:docMk/>
+            <pc:sldMk cId="3185601111" sldId="1568"/>
+            <ac:spMk id="6" creationId="{00000000-0000-0000-0000-000000000000}"/>
+          </ac:spMkLst>
+        </pc:spChg>
+        <pc:spChg chg="mod">
+          <ac:chgData name="Kevin Van Hoogdalem" userId="a04451ef-be22-40ce-b8a8-68f07bdaa89c" providerId="ADAL" clId="{A12536A5-8C6D-4C80-9542-005399029E22}" dt="2017-12-07T18:59:51.047" v="2245" actId="6549"/>
+          <ac:spMkLst>
+            <pc:docMk/>
+            <pc:sldMk cId="3185601111" sldId="1568"/>
+            <ac:spMk id="17" creationId="{00000000-0000-0000-0000-000000000000}"/>
+          </ac:spMkLst>
+        </pc:spChg>
+        <pc:picChg chg="add mod">
+          <ac:chgData name="Kevin Van Hoogdalem" userId="a04451ef-be22-40ce-b8a8-68f07bdaa89c" providerId="ADAL" clId="{A12536A5-8C6D-4C80-9542-005399029E22}" dt="2017-12-07T19:00:14.856" v="2254" actId="1076"/>
+          <ac:picMkLst>
+            <pc:docMk/>
+            <pc:sldMk cId="3185601111" sldId="1568"/>
+            <ac:picMk id="2" creationId="{75BB6394-65B5-4106-B56C-A2847ED5ED5B}"/>
+          </ac:picMkLst>
+        </pc:picChg>
+        <pc:picChg chg="del">
+          <ac:chgData name="Kevin Van Hoogdalem" userId="a04451ef-be22-40ce-b8a8-68f07bdaa89c" providerId="ADAL" clId="{A12536A5-8C6D-4C80-9542-005399029E22}" dt="2017-12-07T18:59:52.956" v="2246" actId="478"/>
+          <ac:picMkLst>
+            <pc:docMk/>
+            <pc:sldMk cId="3185601111" sldId="1568"/>
+            <ac:picMk id="4" creationId="{38099582-A6AC-4658-BEB0-AADF9AEDAE3F}"/>
+          </ac:picMkLst>
+        </pc:picChg>
+      </pc:sldChg>
+      <pc:sldChg chg="addSp delSp modSp add">
+        <pc:chgData name="Kevin Van Hoogdalem" userId="a04451ef-be22-40ce-b8a8-68f07bdaa89c" providerId="ADAL" clId="{A12536A5-8C6D-4C80-9542-005399029E22}" dt="2017-12-07T19:16:31.137" v="3446" actId="478"/>
+        <pc:sldMkLst>
+          <pc:docMk/>
+          <pc:sldMk cId="976386266" sldId="1569"/>
+        </pc:sldMkLst>
+        <pc:spChg chg="mod">
+          <ac:chgData name="Kevin Van Hoogdalem" userId="a04451ef-be22-40ce-b8a8-68f07bdaa89c" providerId="ADAL" clId="{A12536A5-8C6D-4C80-9542-005399029E22}" dt="2017-12-07T19:15:22.237" v="3441" actId="20577"/>
+          <ac:spMkLst>
+            <pc:docMk/>
+            <pc:sldMk cId="976386266" sldId="1569"/>
+            <ac:spMk id="6" creationId="{00000000-0000-0000-0000-000000000000}"/>
+          </ac:spMkLst>
+        </pc:spChg>
+        <pc:spChg chg="mod">
+          <ac:chgData name="Kevin Van Hoogdalem" userId="a04451ef-be22-40ce-b8a8-68f07bdaa89c" providerId="ADAL" clId="{A12536A5-8C6D-4C80-9542-005399029E22}" dt="2017-12-07T19:07:51.012" v="2905" actId="20577"/>
+          <ac:spMkLst>
+            <pc:docMk/>
+            <pc:sldMk cId="976386266" sldId="1569"/>
+            <ac:spMk id="17" creationId="{00000000-0000-0000-0000-000000000000}"/>
+          </ac:spMkLst>
+        </pc:spChg>
+        <pc:picChg chg="del">
+          <ac:chgData name="Kevin Van Hoogdalem" userId="a04451ef-be22-40ce-b8a8-68f07bdaa89c" providerId="ADAL" clId="{A12536A5-8C6D-4C80-9542-005399029E22}" dt="2017-12-07T19:07:52.911" v="2906" actId="478"/>
+          <ac:picMkLst>
+            <pc:docMk/>
+            <pc:sldMk cId="976386266" sldId="1569"/>
+            <ac:picMk id="2" creationId="{75BB6394-65B5-4106-B56C-A2847ED5ED5B}"/>
+          </ac:picMkLst>
+        </pc:picChg>
+        <pc:picChg chg="add mod">
+          <ac:chgData name="Kevin Van Hoogdalem" userId="a04451ef-be22-40ce-b8a8-68f07bdaa89c" providerId="ADAL" clId="{A12536A5-8C6D-4C80-9542-005399029E22}" dt="2017-12-07T19:15:31.207" v="3442" actId="1076"/>
+          <ac:picMkLst>
+            <pc:docMk/>
+            <pc:sldMk cId="976386266" sldId="1569"/>
+            <ac:picMk id="3" creationId="{B617B427-480F-4989-B014-E7EA476FB0CD}"/>
+          </ac:picMkLst>
+        </pc:picChg>
+        <pc:picChg chg="add del mod">
+          <ac:chgData name="Kevin Van Hoogdalem" userId="a04451ef-be22-40ce-b8a8-68f07bdaa89c" providerId="ADAL" clId="{A12536A5-8C6D-4C80-9542-005399029E22}" dt="2017-12-07T19:16:31.137" v="3446" actId="478"/>
+          <ac:picMkLst>
+            <pc:docMk/>
+            <pc:sldMk cId="976386266" sldId="1569"/>
+            <ac:picMk id="4" creationId="{5FE21127-68B4-4295-A745-2E9CA7FB2664}"/>
+          </ac:picMkLst>
+        </pc:picChg>
+      </pc:sldChg>
+      <pc:sldChg chg="addSp delSp modSp add">
+        <pc:chgData name="Kevin Van Hoogdalem" userId="a04451ef-be22-40ce-b8a8-68f07bdaa89c" providerId="ADAL" clId="{A12536A5-8C6D-4C80-9542-005399029E22}" dt="2017-12-07T19:21:29.914" v="3884" actId="1076"/>
+        <pc:sldMkLst>
+          <pc:docMk/>
+          <pc:sldMk cId="601170866" sldId="1570"/>
+        </pc:sldMkLst>
+        <pc:spChg chg="add del mod">
+          <ac:chgData name="Kevin Van Hoogdalem" userId="a04451ef-be22-40ce-b8a8-68f07bdaa89c" providerId="ADAL" clId="{A12536A5-8C6D-4C80-9542-005399029E22}" dt="2017-12-07T19:16:50.584" v="3465" actId="478"/>
+          <ac:spMkLst>
+            <pc:docMk/>
+            <pc:sldMk cId="601170866" sldId="1570"/>
+            <ac:spMk id="5" creationId="{CA0A6A49-97EA-461F-8A1B-BCC385A26B14}"/>
+          </ac:spMkLst>
+        </pc:spChg>
+        <pc:spChg chg="del">
+          <ac:chgData name="Kevin Van Hoogdalem" userId="a04451ef-be22-40ce-b8a8-68f07bdaa89c" providerId="ADAL" clId="{A12536A5-8C6D-4C80-9542-005399029E22}" dt="2017-12-07T19:16:46.010" v="3463" actId="478"/>
+          <ac:spMkLst>
+            <pc:docMk/>
+            <pc:sldMk cId="601170866" sldId="1570"/>
+            <ac:spMk id="6" creationId="{00000000-0000-0000-0000-000000000000}"/>
+          </ac:spMkLst>
+        </pc:spChg>
+        <pc:spChg chg="add mod">
+          <ac:chgData name="Kevin Van Hoogdalem" userId="a04451ef-be22-40ce-b8a8-68f07bdaa89c" providerId="ADAL" clId="{A12536A5-8C6D-4C80-9542-005399029E22}" dt="2017-12-07T19:20:38.883" v="3877" actId="20577"/>
+          <ac:spMkLst>
+            <pc:docMk/>
+            <pc:sldMk cId="601170866" sldId="1570"/>
+            <ac:spMk id="8" creationId="{92247DE7-7798-401F-95E0-531525B1C759}"/>
+          </ac:spMkLst>
+        </pc:spChg>
+        <pc:spChg chg="mod">
+          <ac:chgData name="Kevin Van Hoogdalem" userId="a04451ef-be22-40ce-b8a8-68f07bdaa89c" providerId="ADAL" clId="{A12536A5-8C6D-4C80-9542-005399029E22}" dt="2017-12-07T19:16:36.223" v="3461" actId="20577"/>
+          <ac:spMkLst>
+            <pc:docMk/>
+            <pc:sldMk cId="601170866" sldId="1570"/>
+            <ac:spMk id="17" creationId="{00000000-0000-0000-0000-000000000000}"/>
+          </ac:spMkLst>
+        </pc:spChg>
+        <pc:picChg chg="del">
+          <ac:chgData name="Kevin Van Hoogdalem" userId="a04451ef-be22-40ce-b8a8-68f07bdaa89c" providerId="ADAL" clId="{A12536A5-8C6D-4C80-9542-005399029E22}" dt="2017-12-07T19:16:38.624" v="3462" actId="478"/>
+          <ac:picMkLst>
+            <pc:docMk/>
+            <pc:sldMk cId="601170866" sldId="1570"/>
+            <ac:picMk id="3" creationId="{B617B427-480F-4989-B014-E7EA476FB0CD}"/>
+          </ac:picMkLst>
+        </pc:picChg>
+        <pc:picChg chg="mod">
+          <ac:chgData name="Kevin Van Hoogdalem" userId="a04451ef-be22-40ce-b8a8-68f07bdaa89c" providerId="ADAL" clId="{A12536A5-8C6D-4C80-9542-005399029E22}" dt="2017-12-07T19:20:32.304" v="3872" actId="1076"/>
+          <ac:picMkLst>
+            <pc:docMk/>
+            <pc:sldMk cId="601170866" sldId="1570"/>
+            <ac:picMk id="4" creationId="{5FE21127-68B4-4295-A745-2E9CA7FB2664}"/>
+          </ac:picMkLst>
+        </pc:picChg>
+        <pc:picChg chg="add mod">
+          <ac:chgData name="Kevin Van Hoogdalem" userId="a04451ef-be22-40ce-b8a8-68f07bdaa89c" providerId="ADAL" clId="{A12536A5-8C6D-4C80-9542-005399029E22}" dt="2017-12-07T19:20:29.254" v="3871" actId="1076"/>
+          <ac:picMkLst>
+            <pc:docMk/>
+            <pc:sldMk cId="601170866" sldId="1570"/>
+            <ac:picMk id="7" creationId="{DB99504A-6711-4353-AA39-35F852C9D25B}"/>
+          </ac:picMkLst>
+        </pc:picChg>
+        <pc:picChg chg="add mod">
+          <ac:chgData name="Kevin Van Hoogdalem" userId="a04451ef-be22-40ce-b8a8-68f07bdaa89c" providerId="ADAL" clId="{A12536A5-8C6D-4C80-9542-005399029E22}" dt="2017-12-07T19:21:29.914" v="3884" actId="1076"/>
+          <ac:picMkLst>
+            <pc:docMk/>
+            <pc:sldMk cId="601170866" sldId="1570"/>
+            <ac:picMk id="9" creationId="{5DD6AA63-88E2-45FC-A0C4-1673FCBAC71F}"/>
+          </ac:picMkLst>
+        </pc:picChg>
+      </pc:sldChg>
+      <pc:sldChg chg="addSp delSp modSp add">
+        <pc:chgData name="Kevin Van Hoogdalem" userId="a04451ef-be22-40ce-b8a8-68f07bdaa89c" providerId="ADAL" clId="{A12536A5-8C6D-4C80-9542-005399029E22}" dt="2017-12-07T19:25:01.264" v="4450" actId="20577"/>
+        <pc:sldMkLst>
+          <pc:docMk/>
+          <pc:sldMk cId="770852895" sldId="1571"/>
+        </pc:sldMkLst>
+        <pc:spChg chg="mod ord">
+          <ac:chgData name="Kevin Van Hoogdalem" userId="a04451ef-be22-40ce-b8a8-68f07bdaa89c" providerId="ADAL" clId="{A12536A5-8C6D-4C80-9542-005399029E22}" dt="2017-12-07T19:25:01.264" v="4450" actId="20577"/>
+          <ac:spMkLst>
+            <pc:docMk/>
+            <pc:sldMk cId="770852895" sldId="1571"/>
+            <ac:spMk id="8" creationId="{92247DE7-7798-401F-95E0-531525B1C759}"/>
+          </ac:spMkLst>
+        </pc:spChg>
+        <pc:spChg chg="mod">
+          <ac:chgData name="Kevin Van Hoogdalem" userId="a04451ef-be22-40ce-b8a8-68f07bdaa89c" providerId="ADAL" clId="{A12536A5-8C6D-4C80-9542-005399029E22}" dt="2017-12-07T19:21:38.817" v="3917" actId="20577"/>
+          <ac:spMkLst>
+            <pc:docMk/>
+            <pc:sldMk cId="770852895" sldId="1571"/>
+            <ac:spMk id="17" creationId="{00000000-0000-0000-0000-000000000000}"/>
+          </ac:spMkLst>
+        </pc:spChg>
+        <pc:picChg chg="add mod">
+          <ac:chgData name="Kevin Van Hoogdalem" userId="a04451ef-be22-40ce-b8a8-68f07bdaa89c" providerId="ADAL" clId="{A12536A5-8C6D-4C80-9542-005399029E22}" dt="2017-12-07T19:22:25.493" v="3925" actId="1076"/>
+          <ac:picMkLst>
+            <pc:docMk/>
+            <pc:sldMk cId="770852895" sldId="1571"/>
+            <ac:picMk id="2" creationId="{CA9B3C4B-D210-4226-8E20-DE2725277EE5}"/>
+          </ac:picMkLst>
+        </pc:picChg>
+        <pc:picChg chg="del">
+          <ac:chgData name="Kevin Van Hoogdalem" userId="a04451ef-be22-40ce-b8a8-68f07bdaa89c" providerId="ADAL" clId="{A12536A5-8C6D-4C80-9542-005399029E22}" dt="2017-12-07T19:21:48.824" v="3919" actId="478"/>
+          <ac:picMkLst>
+            <pc:docMk/>
+            <pc:sldMk cId="770852895" sldId="1571"/>
+            <ac:picMk id="4" creationId="{5FE21127-68B4-4295-A745-2E9CA7FB2664}"/>
+          </ac:picMkLst>
+        </pc:picChg>
+        <pc:picChg chg="del">
+          <ac:chgData name="Kevin Van Hoogdalem" userId="a04451ef-be22-40ce-b8a8-68f07bdaa89c" providerId="ADAL" clId="{A12536A5-8C6D-4C80-9542-005399029E22}" dt="2017-12-07T19:21:48.824" v="3919" actId="478"/>
+          <ac:picMkLst>
+            <pc:docMk/>
+            <pc:sldMk cId="770852895" sldId="1571"/>
+            <ac:picMk id="7" creationId="{DB99504A-6711-4353-AA39-35F852C9D25B}"/>
+          </ac:picMkLst>
+        </pc:picChg>
+        <pc:picChg chg="mod">
+          <ac:chgData name="Kevin Van Hoogdalem" userId="a04451ef-be22-40ce-b8a8-68f07bdaa89c" providerId="ADAL" clId="{A12536A5-8C6D-4C80-9542-005399029E22}" dt="2017-12-07T19:22:23.053" v="3924" actId="1076"/>
+          <ac:picMkLst>
+            <pc:docMk/>
+            <pc:sldMk cId="770852895" sldId="1571"/>
+            <ac:picMk id="9" creationId="{5DD6AA63-88E2-45FC-A0C4-1673FCBAC71F}"/>
+          </ac:picMkLst>
+        </pc:picChg>
+      </pc:sldChg>
+      <pc:sldChg chg="addSp delSp modSp add">
+        <pc:chgData name="Kevin Van Hoogdalem" userId="a04451ef-be22-40ce-b8a8-68f07bdaa89c" providerId="ADAL" clId="{A12536A5-8C6D-4C80-9542-005399029E22}" dt="2017-12-07T19:31:59.569" v="5124" actId="255"/>
+        <pc:sldMkLst>
+          <pc:docMk/>
+          <pc:sldMk cId="9812839" sldId="1572"/>
+        </pc:sldMkLst>
+        <pc:spChg chg="mod">
+          <ac:chgData name="Kevin Van Hoogdalem" userId="a04451ef-be22-40ce-b8a8-68f07bdaa89c" providerId="ADAL" clId="{A12536A5-8C6D-4C80-9542-005399029E22}" dt="2017-12-07T19:27:57.052" v="4687" actId="20577"/>
+          <ac:spMkLst>
+            <pc:docMk/>
+            <pc:sldMk cId="9812839" sldId="1572"/>
+            <ac:spMk id="6" creationId="{00000000-0000-0000-0000-000000000000}"/>
+          </ac:spMkLst>
+        </pc:spChg>
+        <pc:spChg chg="add mod">
+          <ac:chgData name="Kevin Van Hoogdalem" userId="a04451ef-be22-40ce-b8a8-68f07bdaa89c" providerId="ADAL" clId="{A12536A5-8C6D-4C80-9542-005399029E22}" dt="2017-12-07T19:31:59.569" v="5124" actId="255"/>
+          <ac:spMkLst>
+            <pc:docMk/>
+            <pc:sldMk cId="9812839" sldId="1572"/>
+            <ac:spMk id="11" creationId="{1F6DAF70-8021-4C74-B17A-C600BA874B9F}"/>
+          </ac:spMkLst>
+        </pc:spChg>
+        <pc:spChg chg="mod">
+          <ac:chgData name="Kevin Van Hoogdalem" userId="a04451ef-be22-40ce-b8a8-68f07bdaa89c" providerId="ADAL" clId="{A12536A5-8C6D-4C80-9542-005399029E22}" dt="2017-12-07T19:25:29.806" v="4466" actId="20577"/>
+          <ac:spMkLst>
+            <pc:docMk/>
+            <pc:sldMk cId="9812839" sldId="1572"/>
+            <ac:spMk id="17" creationId="{00000000-0000-0000-0000-000000000000}"/>
+          </ac:spMkLst>
+        </pc:spChg>
+        <pc:picChg chg="add del mod">
+          <ac:chgData name="Kevin Van Hoogdalem" userId="a04451ef-be22-40ce-b8a8-68f07bdaa89c" providerId="ADAL" clId="{A12536A5-8C6D-4C80-9542-005399029E22}" dt="2017-12-07T19:29:39.850" v="4844" actId="478"/>
+          <ac:picMkLst>
+            <pc:docMk/>
+            <pc:sldMk cId="9812839" sldId="1572"/>
+            <ac:picMk id="2" creationId="{743BD2F1-F278-47DB-9201-C2394355C1DF}"/>
+          </ac:picMkLst>
+        </pc:picChg>
+        <pc:picChg chg="del">
+          <ac:chgData name="Kevin Van Hoogdalem" userId="a04451ef-be22-40ce-b8a8-68f07bdaa89c" providerId="ADAL" clId="{A12536A5-8C6D-4C80-9542-005399029E22}" dt="2017-12-07T19:25:42.325" v="4467" actId="478"/>
+          <ac:picMkLst>
+            <pc:docMk/>
+            <pc:sldMk cId="9812839" sldId="1572"/>
+            <ac:picMk id="3" creationId="{9E962D96-0C76-44AE-9A4B-96A714689099}"/>
+          </ac:picMkLst>
+        </pc:picChg>
+        <pc:picChg chg="del">
+          <ac:chgData name="Kevin Van Hoogdalem" userId="a04451ef-be22-40ce-b8a8-68f07bdaa89c" providerId="ADAL" clId="{A12536A5-8C6D-4C80-9542-005399029E22}" dt="2017-12-07T19:25:42.325" v="4467" actId="478"/>
+          <ac:picMkLst>
+            <pc:docMk/>
+            <pc:sldMk cId="9812839" sldId="1572"/>
+            <ac:picMk id="4" creationId="{4BE7CB89-3A40-4C5F-942D-2A8AE6045099}"/>
+          </ac:picMkLst>
+        </pc:picChg>
+        <pc:picChg chg="add mod">
+          <ac:chgData name="Kevin Van Hoogdalem" userId="a04451ef-be22-40ce-b8a8-68f07bdaa89c" providerId="ADAL" clId="{A12536A5-8C6D-4C80-9542-005399029E22}" dt="2017-12-07T19:29:44.965" v="4848" actId="1076"/>
+          <ac:picMkLst>
+            <pc:docMk/>
+            <pc:sldMk cId="9812839" sldId="1572"/>
+            <ac:picMk id="5" creationId="{8143E6B7-4AE9-40F3-B1DF-41B4F34B6571}"/>
+          </ac:picMkLst>
+        </pc:picChg>
+        <pc:picChg chg="del">
+          <ac:chgData name="Kevin Van Hoogdalem" userId="a04451ef-be22-40ce-b8a8-68f07bdaa89c" providerId="ADAL" clId="{A12536A5-8C6D-4C80-9542-005399029E22}" dt="2017-12-07T19:25:42.325" v="4467" actId="478"/>
+          <ac:picMkLst>
+            <pc:docMk/>
+            <pc:sldMk cId="9812839" sldId="1572"/>
+            <ac:picMk id="9" creationId="{3026057A-0636-429C-98F8-E341C6423E94}"/>
+          </ac:picMkLst>
+        </pc:picChg>
+        <pc:picChg chg="del">
+          <ac:chgData name="Kevin Van Hoogdalem" userId="a04451ef-be22-40ce-b8a8-68f07bdaa89c" providerId="ADAL" clId="{A12536A5-8C6D-4C80-9542-005399029E22}" dt="2017-12-07T19:25:42.325" v="4467" actId="478"/>
+          <ac:picMkLst>
+            <pc:docMk/>
+            <pc:sldMk cId="9812839" sldId="1572"/>
+            <ac:picMk id="10" creationId="{9C888A9E-9DFC-4AE2-B2CF-FF12D47BD44A}"/>
+          </ac:picMkLst>
+        </pc:picChg>
+      </pc:sldChg>
+    </pc:docChg>
+  </pc:docChgLst>
 </pc:chgInfo>
 </file>
 
@@ -1705,7 +1703,7 @@
               <a:rPr lang="en-US" smtClean="0">
                 <a:latin typeface="Segoe UI" pitchFamily="34" charset="0"/>
               </a:rPr>
-              <a:t>3/21/2018 4:20 PM</a:t>
+              <a:t>5/31/2018 11:45 AM</a:t>
             </a:fld>
             <a:endParaRPr lang="en-US" dirty="0">
               <a:latin typeface="Segoe UI" pitchFamily="34" charset="0"/>
@@ -1999,7 +1997,7 @@
           <a:p>
             <a:fld id="{D18B56EA-E28F-4F92-9F16-7A6F2501B303}" type="datetime8">
               <a:rPr lang="en-US" smtClean="0"/>
-              <a:t>3/21/2018 4:18 PM</a:t>
+              <a:t>5/31/2018 11:36 AM</a:t>
             </a:fld>
             <a:endParaRPr lang="en-US" dirty="0"/>
           </a:p>
@@ -2382,7 +2380,7 @@
           <a:p>
             <a:fld id="{9B1409BE-C23F-4F40-BAAB-9DF15A939E6F}" type="datetime8">
               <a:rPr lang="en-US" smtClean="0"/>
-              <a:t>3/21/2018 4:18 PM</a:t>
+              <a:t>5/31/2018 11:36 AM</a:t>
             </a:fld>
             <a:endParaRPr lang="en-US" dirty="0"/>
           </a:p>
@@ -2563,7 +2561,7 @@
           <a:p>
             <a:fld id="{9B1409BE-C23F-4F40-BAAB-9DF15A939E6F}" type="datetime8">
               <a:rPr lang="en-US" smtClean="0"/>
-              <a:t>3/21/2018 4:20 PM</a:t>
+              <a:t>5/31/2018 11:36 AM</a:t>
             </a:fld>
             <a:endParaRPr lang="en-US" dirty="0"/>
           </a:p>
@@ -2744,7 +2742,7 @@
           <a:p>
             <a:fld id="{9B1409BE-C23F-4F40-BAAB-9DF15A939E6F}" type="datetime8">
               <a:rPr lang="en-US" smtClean="0"/>
-              <a:t>3/21/2018 4:18 PM</a:t>
+              <a:t>5/31/2018 11:36 AM</a:t>
             </a:fld>
             <a:endParaRPr lang="en-US" dirty="0"/>
           </a:p>
@@ -2925,7 +2923,7 @@
           <a:p>
             <a:fld id="{9B1409BE-C23F-4F40-BAAB-9DF15A939E6F}" type="datetime8">
               <a:rPr lang="en-US" smtClean="0"/>
-              <a:t>3/21/2018 4:18 PM</a:t>
+              <a:t>5/31/2018 11:36 AM</a:t>
             </a:fld>
             <a:endParaRPr lang="en-US" dirty="0"/>
           </a:p>
@@ -3106,7 +3104,7 @@
           <a:p>
             <a:fld id="{9B1409BE-C23F-4F40-BAAB-9DF15A939E6F}" type="datetime8">
               <a:rPr lang="en-US" smtClean="0"/>
-              <a:t>3/21/2018 4:28 PM</a:t>
+              <a:t>5/31/2018 11:36 AM</a:t>
             </a:fld>
             <a:endParaRPr lang="en-US" dirty="0"/>
           </a:p>
@@ -3287,7 +3285,7 @@
           <a:p>
             <a:fld id="{9B1409BE-C23F-4F40-BAAB-9DF15A939E6F}" type="datetime8">
               <a:rPr lang="en-US" smtClean="0"/>
-              <a:t>3/21/2018 4:18 PM</a:t>
+              <a:t>5/31/2018 11:36 AM</a:t>
             </a:fld>
             <a:endParaRPr lang="en-US" dirty="0"/>
           </a:p>
@@ -3468,7 +3466,7 @@
           <a:p>
             <a:fld id="{9B1409BE-C23F-4F40-BAAB-9DF15A939E6F}" type="datetime8">
               <a:rPr lang="en-US" smtClean="0"/>
-              <a:t>3/21/2018 4:18 PM</a:t>
+              <a:t>5/31/2018 11:50 AM</a:t>
             </a:fld>
             <a:endParaRPr lang="en-US" dirty="0"/>
           </a:p>
@@ -3649,7 +3647,7 @@
           <a:p>
             <a:fld id="{9B1409BE-C23F-4F40-BAAB-9DF15A939E6F}" type="datetime8">
               <a:rPr lang="en-US" smtClean="0"/>
-              <a:t>3/21/2018 4:18 PM</a:t>
+              <a:t>5/31/2018 11:36 AM</a:t>
             </a:fld>
             <a:endParaRPr lang="en-US" dirty="0"/>
           </a:p>
@@ -3682,7 +3680,7 @@
     </p:spTree>
     <p:extLst>
       <p:ext uri="{BB962C8B-B14F-4D97-AF65-F5344CB8AC3E}">
-        <p14:creationId xmlns:p14="http://schemas.microsoft.com/office/powerpoint/2010/main" val="960552533"/>
+        <p14:creationId xmlns:p14="http://schemas.microsoft.com/office/powerpoint/2010/main" val="2601562014"/>
       </p:ext>
     </p:extLst>
   </p:cSld>
@@ -3830,7 +3828,7 @@
           <a:p>
             <a:fld id="{9B1409BE-C23F-4F40-BAAB-9DF15A939E6F}" type="datetime8">
               <a:rPr lang="en-US" smtClean="0"/>
-              <a:t>3/21/2018 4:18 PM</a:t>
+              <a:t>5/31/2018 11:36 AM</a:t>
             </a:fld>
             <a:endParaRPr lang="en-US" dirty="0"/>
           </a:p>
@@ -3863,7 +3861,7 @@
     </p:spTree>
     <p:extLst>
       <p:ext uri="{BB962C8B-B14F-4D97-AF65-F5344CB8AC3E}">
-        <p14:creationId xmlns:p14="http://schemas.microsoft.com/office/powerpoint/2010/main" val="2937424087"/>
+        <p14:creationId xmlns:p14="http://schemas.microsoft.com/office/powerpoint/2010/main" val="2185626164"/>
       </p:ext>
     </p:extLst>
   </p:cSld>
@@ -4011,7 +4009,7 @@
           <a:p>
             <a:fld id="{9B1409BE-C23F-4F40-BAAB-9DF15A939E6F}" type="datetime8">
               <a:rPr lang="en-US" smtClean="0"/>
-              <a:t>3/21/2018 4:18 PM</a:t>
+              <a:t>5/31/2018 11:36 AM</a:t>
             </a:fld>
             <a:endParaRPr lang="en-US" dirty="0"/>
           </a:p>
@@ -4044,7 +4042,7 @@
     </p:spTree>
     <p:extLst>
       <p:ext uri="{BB962C8B-B14F-4D97-AF65-F5344CB8AC3E}">
-        <p14:creationId xmlns:p14="http://schemas.microsoft.com/office/powerpoint/2010/main" val="2601562014"/>
+        <p14:creationId xmlns:p14="http://schemas.microsoft.com/office/powerpoint/2010/main" val="1265138912"/>
       </p:ext>
     </p:extLst>
   </p:cSld>
@@ -4192,7 +4190,7 @@
           <a:p>
             <a:fld id="{9B1409BE-C23F-4F40-BAAB-9DF15A939E6F}" type="datetime8">
               <a:rPr lang="en-US" smtClean="0"/>
-              <a:t>3/21/2018 4:18 PM</a:t>
+              <a:t>5/31/2018 11:36 AM</a:t>
             </a:fld>
             <a:endParaRPr lang="en-US" dirty="0"/>
           </a:p>
@@ -4225,7 +4223,7 @@
     </p:spTree>
     <p:extLst>
       <p:ext uri="{BB962C8B-B14F-4D97-AF65-F5344CB8AC3E}">
-        <p14:creationId xmlns:p14="http://schemas.microsoft.com/office/powerpoint/2010/main" val="2185626164"/>
+        <p14:creationId xmlns:p14="http://schemas.microsoft.com/office/powerpoint/2010/main" val="248022298"/>
       </p:ext>
     </p:extLst>
   </p:cSld>
@@ -4373,7 +4371,7 @@
           <a:p>
             <a:fld id="{9B1409BE-C23F-4F40-BAAB-9DF15A939E6F}" type="datetime8">
               <a:rPr lang="en-US" smtClean="0"/>
-              <a:t>3/21/2018 4:18 PM</a:t>
+              <a:t>5/31/2018 11:36 AM</a:t>
             </a:fld>
             <a:endParaRPr lang="en-US" dirty="0"/>
           </a:p>
@@ -4554,7 +4552,7 @@
           <a:p>
             <a:fld id="{9B1409BE-C23F-4F40-BAAB-9DF15A939E6F}" type="datetime8">
               <a:rPr lang="en-US" smtClean="0"/>
-              <a:t>3/21/2018 4:18 PM</a:t>
+              <a:t>5/31/2018 11:36 AM</a:t>
             </a:fld>
             <a:endParaRPr lang="en-US" dirty="0"/>
           </a:p>
@@ -4579,368 +4577,6 @@
               <a:rPr lang="en-US" smtClean="0"/>
               <a:pPr/>
               <a:t>20</a:t>
-            </a:fld>
-            <a:endParaRPr lang="en-US" dirty="0"/>
-          </a:p>
-        </p:txBody>
-      </p:sp>
-    </p:spTree>
-    <p:extLst>
-      <p:ext uri="{BB962C8B-B14F-4D97-AF65-F5344CB8AC3E}">
-        <p14:creationId xmlns:p14="http://schemas.microsoft.com/office/powerpoint/2010/main" val="1265138912"/>
-      </p:ext>
-    </p:extLst>
-  </p:cSld>
-  <p:clrMapOvr>
-    <a:masterClrMapping/>
-  </p:clrMapOvr>
-</p:notes>
-</file>
-
-<file path=ppt/notesSlides/notesSlide21.xml><?xml version="1.0" encoding="utf-8"?>
-<p:notes xmlns:a="http://schemas.openxmlformats.org/drawingml/2006/main" xmlns:r="http://schemas.openxmlformats.org/officeDocument/2006/relationships" xmlns:p="http://schemas.openxmlformats.org/presentationml/2006/main">
-  <p:cSld>
-    <p:spTree>
-      <p:nvGrpSpPr>
-        <p:cNvPr id="1" name=""/>
-        <p:cNvGrpSpPr/>
-        <p:nvPr/>
-      </p:nvGrpSpPr>
-      <p:grpSpPr>
-        <a:xfrm>
-          <a:off x="0" y="0"/>
-          <a:ext cx="0" cy="0"/>
-          <a:chOff x="0" y="0"/>
-          <a:chExt cx="0" cy="0"/>
-        </a:xfrm>
-      </p:grpSpPr>
-      <p:sp>
-        <p:nvSpPr>
-          <p:cNvPr id="2" name="Slide Image Placeholder 1"/>
-          <p:cNvSpPr>
-            <a:spLocks noGrp="1" noRot="1" noChangeAspect="1"/>
-          </p:cNvSpPr>
-          <p:nvPr>
-            <p:ph type="sldImg"/>
-          </p:nvPr>
-        </p:nvSpPr>
-        <p:spPr/>
-      </p:sp>
-      <p:sp>
-        <p:nvSpPr>
-          <p:cNvPr id="3" name="Notes Placeholder 2"/>
-          <p:cNvSpPr>
-            <a:spLocks noGrp="1"/>
-          </p:cNvSpPr>
-          <p:nvPr>
-            <p:ph type="body" idx="1"/>
-          </p:nvPr>
-        </p:nvSpPr>
-        <p:spPr/>
-        <p:txBody>
-          <a:bodyPr/>
-          <a:lstStyle/>
-          <a:p>
-            <a:endParaRPr lang="en-US" dirty="0"/>
-          </a:p>
-        </p:txBody>
-      </p:sp>
-      <p:sp>
-        <p:nvSpPr>
-          <p:cNvPr id="4" name="Header Placeholder 3"/>
-          <p:cNvSpPr>
-            <a:spLocks noGrp="1"/>
-          </p:cNvSpPr>
-          <p:nvPr>
-            <p:ph type="hdr" sz="quarter" idx="10"/>
-          </p:nvPr>
-        </p:nvSpPr>
-        <p:spPr/>
-        <p:txBody>
-          <a:bodyPr/>
-          <a:lstStyle/>
-          <a:p>
-            <a:endParaRPr lang="en-US" dirty="0"/>
-          </a:p>
-        </p:txBody>
-      </p:sp>
-      <p:sp>
-        <p:nvSpPr>
-          <p:cNvPr id="5" name="Footer Placeholder 4"/>
-          <p:cNvSpPr>
-            <a:spLocks noGrp="1"/>
-          </p:cNvSpPr>
-          <p:nvPr>
-            <p:ph type="ftr" sz="quarter" idx="11"/>
-          </p:nvPr>
-        </p:nvSpPr>
-        <p:spPr/>
-        <p:txBody>
-          <a:bodyPr/>
-          <a:lstStyle/>
-          <a:p>
-            <a:pPr defTabSz="914099" eaLnBrk="0" hangingPunct="0"/>
-            <a:r>
-              <a:rPr lang="en-US" sz="400">
-                <a:gradFill>
-                  <a:gsLst>
-                    <a:gs pos="0">
-                      <a:prstClr val="black"/>
-                    </a:gs>
-                    <a:gs pos="100000">
-                      <a:prstClr val="black"/>
-                    </a:gs>
-                  </a:gsLst>
-                  <a:lin ang="5400000" scaled="0"/>
-                </a:gradFill>
-                <a:latin typeface="Segoe UI" pitchFamily="34" charset="0"/>
-                <a:ea typeface="Segoe UI" pitchFamily="34" charset="0"/>
-                <a:cs typeface="Segoe UI" pitchFamily="34" charset="0"/>
-              </a:rPr>
-              <a:t>© Microsoft Corporation. All rights reserved. MICROSOFT MAKES NO WARRANTIES, EXPRESS, IMPLIED OR STATUTORY, AS TO THE INFORMATION IN THIS PRESENTATION.</a:t>
-            </a:r>
-            <a:endParaRPr lang="en-US" sz="400" dirty="0">
-              <a:gradFill>
-                <a:gsLst>
-                  <a:gs pos="0">
-                    <a:prstClr val="black"/>
-                  </a:gs>
-                  <a:gs pos="100000">
-                    <a:prstClr val="black"/>
-                  </a:gs>
-                </a:gsLst>
-                <a:lin ang="5400000" scaled="0"/>
-              </a:gradFill>
-              <a:latin typeface="Segoe UI" pitchFamily="34" charset="0"/>
-              <a:ea typeface="Segoe UI" pitchFamily="34" charset="0"/>
-              <a:cs typeface="Segoe UI" pitchFamily="34" charset="0"/>
-            </a:endParaRPr>
-          </a:p>
-        </p:txBody>
-      </p:sp>
-      <p:sp>
-        <p:nvSpPr>
-          <p:cNvPr id="6" name="Date Placeholder 5"/>
-          <p:cNvSpPr>
-            <a:spLocks noGrp="1"/>
-          </p:cNvSpPr>
-          <p:nvPr>
-            <p:ph type="dt" idx="12"/>
-          </p:nvPr>
-        </p:nvSpPr>
-        <p:spPr/>
-        <p:txBody>
-          <a:bodyPr/>
-          <a:lstStyle/>
-          <a:p>
-            <a:fld id="{9B1409BE-C23F-4F40-BAAB-9DF15A939E6F}" type="datetime8">
-              <a:rPr lang="en-US" smtClean="0"/>
-              <a:t>3/21/2018 4:18 PM</a:t>
-            </a:fld>
-            <a:endParaRPr lang="en-US" dirty="0"/>
-          </a:p>
-        </p:txBody>
-      </p:sp>
-      <p:sp>
-        <p:nvSpPr>
-          <p:cNvPr id="7" name="Slide Number Placeholder 6"/>
-          <p:cNvSpPr>
-            <a:spLocks noGrp="1"/>
-          </p:cNvSpPr>
-          <p:nvPr>
-            <p:ph type="sldNum" sz="quarter" idx="13"/>
-          </p:nvPr>
-        </p:nvSpPr>
-        <p:spPr/>
-        <p:txBody>
-          <a:bodyPr/>
-          <a:lstStyle/>
-          <a:p>
-            <a:fld id="{B4008EB6-D09E-4580-8CD6-DDB14511944F}" type="slidenum">
-              <a:rPr lang="en-US" smtClean="0"/>
-              <a:pPr/>
-              <a:t>21</a:t>
-            </a:fld>
-            <a:endParaRPr lang="en-US" dirty="0"/>
-          </a:p>
-        </p:txBody>
-      </p:sp>
-    </p:spTree>
-    <p:extLst>
-      <p:ext uri="{BB962C8B-B14F-4D97-AF65-F5344CB8AC3E}">
-        <p14:creationId xmlns:p14="http://schemas.microsoft.com/office/powerpoint/2010/main" val="248022298"/>
-      </p:ext>
-    </p:extLst>
-  </p:cSld>
-  <p:clrMapOvr>
-    <a:masterClrMapping/>
-  </p:clrMapOvr>
-</p:notes>
-</file>
-
-<file path=ppt/notesSlides/notesSlide22.xml><?xml version="1.0" encoding="utf-8"?>
-<p:notes xmlns:a="http://schemas.openxmlformats.org/drawingml/2006/main" xmlns:r="http://schemas.openxmlformats.org/officeDocument/2006/relationships" xmlns:p="http://schemas.openxmlformats.org/presentationml/2006/main">
-  <p:cSld>
-    <p:spTree>
-      <p:nvGrpSpPr>
-        <p:cNvPr id="1" name=""/>
-        <p:cNvGrpSpPr/>
-        <p:nvPr/>
-      </p:nvGrpSpPr>
-      <p:grpSpPr>
-        <a:xfrm>
-          <a:off x="0" y="0"/>
-          <a:ext cx="0" cy="0"/>
-          <a:chOff x="0" y="0"/>
-          <a:chExt cx="0" cy="0"/>
-        </a:xfrm>
-      </p:grpSpPr>
-      <p:sp>
-        <p:nvSpPr>
-          <p:cNvPr id="2" name="Slide Image Placeholder 1"/>
-          <p:cNvSpPr>
-            <a:spLocks noGrp="1" noRot="1" noChangeAspect="1"/>
-          </p:cNvSpPr>
-          <p:nvPr>
-            <p:ph type="sldImg"/>
-          </p:nvPr>
-        </p:nvSpPr>
-        <p:spPr/>
-      </p:sp>
-      <p:sp>
-        <p:nvSpPr>
-          <p:cNvPr id="3" name="Notes Placeholder 2"/>
-          <p:cNvSpPr>
-            <a:spLocks noGrp="1"/>
-          </p:cNvSpPr>
-          <p:nvPr>
-            <p:ph type="body" idx="1"/>
-          </p:nvPr>
-        </p:nvSpPr>
-        <p:spPr/>
-        <p:txBody>
-          <a:bodyPr/>
-          <a:lstStyle/>
-          <a:p>
-            <a:endParaRPr lang="en-US" dirty="0"/>
-          </a:p>
-        </p:txBody>
-      </p:sp>
-      <p:sp>
-        <p:nvSpPr>
-          <p:cNvPr id="4" name="Header Placeholder 3"/>
-          <p:cNvSpPr>
-            <a:spLocks noGrp="1"/>
-          </p:cNvSpPr>
-          <p:nvPr>
-            <p:ph type="hdr" sz="quarter" idx="10"/>
-          </p:nvPr>
-        </p:nvSpPr>
-        <p:spPr/>
-        <p:txBody>
-          <a:bodyPr/>
-          <a:lstStyle/>
-          <a:p>
-            <a:endParaRPr lang="en-US" dirty="0"/>
-          </a:p>
-        </p:txBody>
-      </p:sp>
-      <p:sp>
-        <p:nvSpPr>
-          <p:cNvPr id="5" name="Footer Placeholder 4"/>
-          <p:cNvSpPr>
-            <a:spLocks noGrp="1"/>
-          </p:cNvSpPr>
-          <p:nvPr>
-            <p:ph type="ftr" sz="quarter" idx="11"/>
-          </p:nvPr>
-        </p:nvSpPr>
-        <p:spPr/>
-        <p:txBody>
-          <a:bodyPr/>
-          <a:lstStyle/>
-          <a:p>
-            <a:pPr defTabSz="914099" eaLnBrk="0" hangingPunct="0"/>
-            <a:r>
-              <a:rPr lang="en-US" sz="400">
-                <a:gradFill>
-                  <a:gsLst>
-                    <a:gs pos="0">
-                      <a:prstClr val="black"/>
-                    </a:gs>
-                    <a:gs pos="100000">
-                      <a:prstClr val="black"/>
-                    </a:gs>
-                  </a:gsLst>
-                  <a:lin ang="5400000" scaled="0"/>
-                </a:gradFill>
-                <a:latin typeface="Segoe UI" pitchFamily="34" charset="0"/>
-                <a:ea typeface="Segoe UI" pitchFamily="34" charset="0"/>
-                <a:cs typeface="Segoe UI" pitchFamily="34" charset="0"/>
-              </a:rPr>
-              <a:t>© Microsoft Corporation. All rights reserved. MICROSOFT MAKES NO WARRANTIES, EXPRESS, IMPLIED OR STATUTORY, AS TO THE INFORMATION IN THIS PRESENTATION.</a:t>
-            </a:r>
-            <a:endParaRPr lang="en-US" sz="400" dirty="0">
-              <a:gradFill>
-                <a:gsLst>
-                  <a:gs pos="0">
-                    <a:prstClr val="black"/>
-                  </a:gs>
-                  <a:gs pos="100000">
-                    <a:prstClr val="black"/>
-                  </a:gs>
-                </a:gsLst>
-                <a:lin ang="5400000" scaled="0"/>
-              </a:gradFill>
-              <a:latin typeface="Segoe UI" pitchFamily="34" charset="0"/>
-              <a:ea typeface="Segoe UI" pitchFamily="34" charset="0"/>
-              <a:cs typeface="Segoe UI" pitchFamily="34" charset="0"/>
-            </a:endParaRPr>
-          </a:p>
-        </p:txBody>
-      </p:sp>
-      <p:sp>
-        <p:nvSpPr>
-          <p:cNvPr id="6" name="Date Placeholder 5"/>
-          <p:cNvSpPr>
-            <a:spLocks noGrp="1"/>
-          </p:cNvSpPr>
-          <p:nvPr>
-            <p:ph type="dt" idx="12"/>
-          </p:nvPr>
-        </p:nvSpPr>
-        <p:spPr/>
-        <p:txBody>
-          <a:bodyPr/>
-          <a:lstStyle/>
-          <a:p>
-            <a:fld id="{9B1409BE-C23F-4F40-BAAB-9DF15A939E6F}" type="datetime8">
-              <a:rPr lang="en-US" smtClean="0"/>
-              <a:t>3/21/2018 4:18 PM</a:t>
-            </a:fld>
-            <a:endParaRPr lang="en-US" dirty="0"/>
-          </a:p>
-        </p:txBody>
-      </p:sp>
-      <p:sp>
-        <p:nvSpPr>
-          <p:cNvPr id="7" name="Slide Number Placeholder 6"/>
-          <p:cNvSpPr>
-            <a:spLocks noGrp="1"/>
-          </p:cNvSpPr>
-          <p:nvPr>
-            <p:ph type="sldNum" sz="quarter" idx="13"/>
-          </p:nvPr>
-        </p:nvSpPr>
-        <p:spPr/>
-        <p:txBody>
-          <a:bodyPr/>
-          <a:lstStyle/>
-          <a:p>
-            <a:fld id="{B4008EB6-D09E-4580-8CD6-DDB14511944F}" type="slidenum">
-              <a:rPr lang="en-US" smtClean="0"/>
-              <a:pPr/>
-              <a:t>22</a:t>
             </a:fld>
             <a:endParaRPr lang="en-US" dirty="0"/>
           </a:p>
@@ -5097,7 +4733,7 @@
           <a:p>
             <a:fld id="{9B1409BE-C23F-4F40-BAAB-9DF15A939E6F}" type="datetime8">
               <a:rPr lang="en-US" smtClean="0"/>
-              <a:t>3/21/2018 4:18 PM</a:t>
+              <a:t>5/31/2018 11:36 AM</a:t>
             </a:fld>
             <a:endParaRPr lang="en-US" dirty="0"/>
           </a:p>
@@ -5278,7 +4914,7 @@
           <a:p>
             <a:fld id="{9B1409BE-C23F-4F40-BAAB-9DF15A939E6F}" type="datetime8">
               <a:rPr lang="en-US" smtClean="0"/>
-              <a:t>3/21/2018 4:18 PM</a:t>
+              <a:t>5/31/2018 11:36 AM</a:t>
             </a:fld>
             <a:endParaRPr lang="en-US" dirty="0"/>
           </a:p>
@@ -5459,7 +5095,7 @@
           <a:p>
             <a:fld id="{9B1409BE-C23F-4F40-BAAB-9DF15A939E6F}" type="datetime8">
               <a:rPr lang="en-US" smtClean="0"/>
-              <a:t>3/21/2018 4:18 PM</a:t>
+              <a:t>5/31/2018 11:36 AM</a:t>
             </a:fld>
             <a:endParaRPr lang="en-US" dirty="0"/>
           </a:p>
@@ -5640,7 +5276,7 @@
           <a:p>
             <a:fld id="{9B1409BE-C23F-4F40-BAAB-9DF15A939E6F}" type="datetime8">
               <a:rPr lang="en-US" smtClean="0"/>
-              <a:t>3/21/2018 4:18 PM</a:t>
+              <a:t>5/31/2018 11:36 AM</a:t>
             </a:fld>
             <a:endParaRPr lang="en-US" dirty="0"/>
           </a:p>
@@ -5821,7 +5457,7 @@
           <a:p>
             <a:fld id="{9B1409BE-C23F-4F40-BAAB-9DF15A939E6F}" type="datetime8">
               <a:rPr lang="en-US" smtClean="0"/>
-              <a:t>3/21/2018 4:18 PM</a:t>
+              <a:t>5/31/2018 11:36 AM</a:t>
             </a:fld>
             <a:endParaRPr lang="en-US" dirty="0"/>
           </a:p>
@@ -6002,7 +5638,7 @@
           <a:p>
             <a:fld id="{9B1409BE-C23F-4F40-BAAB-9DF15A939E6F}" type="datetime8">
               <a:rPr lang="en-US" smtClean="0"/>
-              <a:t>3/21/2018 4:18 PM</a:t>
+              <a:t>5/31/2018 11:36 AM</a:t>
             </a:fld>
             <a:endParaRPr lang="en-US" dirty="0"/>
           </a:p>
@@ -6183,7 +5819,7 @@
           <a:p>
             <a:fld id="{9B1409BE-C23F-4F40-BAAB-9DF15A939E6F}" type="datetime8">
               <a:rPr lang="en-US" smtClean="0"/>
-              <a:t>3/21/2018 4:18 PM</a:t>
+              <a:t>5/31/2018 11:36 AM</a:t>
             </a:fld>
             <a:endParaRPr lang="en-US" dirty="0"/>
           </a:p>
@@ -19605,10 +19241,10 @@
       </p:sp>
       <p:pic>
         <p:nvPicPr>
-          <p:cNvPr id="2" name="Picture 1">
+          <p:cNvPr id="4" name="Picture 3">
             <a:extLst>
               <a:ext uri="{FF2B5EF4-FFF2-40B4-BE49-F238E27FC236}">
-                <a16:creationId xmlns:a16="http://schemas.microsoft.com/office/drawing/2014/main" id="{91609CEF-0C4C-4A8E-B756-65F66799A226}"/>
+                <a16:creationId xmlns:a16="http://schemas.microsoft.com/office/drawing/2014/main" id="{03ADC41D-D9AD-42C2-B87D-092627995911}"/>
               </a:ext>
             </a:extLst>
           </p:cNvPr>
@@ -19625,8 +19261,8 @@
         </p:blipFill>
         <p:spPr>
           <a:xfrm>
-            <a:off x="2761853" y="5604370"/>
-            <a:ext cx="6303427" cy="841149"/>
+            <a:off x="3091663" y="4499611"/>
+            <a:ext cx="4222537" cy="246856"/>
           </a:xfrm>
           <a:prstGeom prst="rect">
             <a:avLst/>
@@ -19635,10 +19271,10 @@
       </p:pic>
       <p:pic>
         <p:nvPicPr>
-          <p:cNvPr id="3" name="Picture 2">
+          <p:cNvPr id="5" name="Picture 4">
             <a:extLst>
               <a:ext uri="{FF2B5EF4-FFF2-40B4-BE49-F238E27FC236}">
-                <a16:creationId xmlns:a16="http://schemas.microsoft.com/office/drawing/2014/main" id="{0B67AAE3-6A1D-41B7-A254-99E47E0D127E}"/>
+                <a16:creationId xmlns:a16="http://schemas.microsoft.com/office/drawing/2014/main" id="{1DA89E02-7A43-423B-A0EE-15D25D232B60}"/>
               </a:ext>
             </a:extLst>
           </p:cNvPr>
@@ -19655,8 +19291,8 @@
         </p:blipFill>
         <p:spPr>
           <a:xfrm>
-            <a:off x="3069250" y="4505374"/>
-            <a:ext cx="5688632" cy="241093"/>
+            <a:off x="3102636" y="5709278"/>
+            <a:ext cx="5192949" cy="504056"/>
           </a:xfrm>
           <a:prstGeom prst="rect">
             <a:avLst/>
@@ -19736,7 +19372,7 @@
         <p:spPr>
           <a:xfrm>
             <a:off x="313581" y="1697062"/>
-            <a:ext cx="11888787" cy="3908762"/>
+            <a:ext cx="11888787" cy="3976473"/>
           </a:xfrm>
         </p:spPr>
         <p:txBody>
@@ -19753,7 +19389,7 @@
             </a:r>
             <a:r>
               <a:rPr lang="en-US" sz="2200" dirty="0"/>
-              <a:t>, we have defined a 2D structure. To create a 3D structure, we will first extrude all individual objects. Afterwards we will extrude all bounding objects (i.e. objects that extend over the entire area of the bounding box).</a:t>
+              <a:t>, we have defined a 2D structure. To create a 3D structure, we will first extrude all objects that extent over the entire area of the bounding box, and then the extrusion objects defined by the other sketches.</a:t>
             </a:r>
           </a:p>
           <a:p>
@@ -19763,39 +19399,71 @@
             </a:pPr>
             <a:r>
               <a:rPr lang="en-US" sz="2200" dirty="0"/>
-              <a:t>In the makeRun.py file, 3 extrusion objects are defined (</a:t>
+              <a:t>In the makeRun.py file, 9 extrusion objects are defined (substrate, </a:t>
             </a:r>
             <a:r>
               <a:rPr lang="en-US" sz="2200" dirty="0" err="1"/>
-              <a:t>wireGate</a:t>
+              <a:t>backBarrier</a:t>
+            </a:r>
+            <a:r>
+              <a:rPr lang="en-US" sz="2200" dirty="0"/>
+              <a:t>, …). Below ‘</a:t>
+            </a:r>
+            <a:r>
+              <a:rPr lang="en-US" sz="2200" i="1" dirty="0" err="1"/>
+              <a:t>alFilm</a:t>
+            </a:r>
+            <a:r>
+              <a:rPr lang="en-US" sz="2200" dirty="0"/>
+              <a:t>’ is shown as an example. In the </a:t>
+            </a:r>
+            <a:r>
+              <a:rPr lang="en-US" sz="2200" dirty="0" err="1"/>
+              <a:t>runModel.addPart</a:t>
+            </a:r>
+            <a:r>
+              <a:rPr lang="en-US" sz="2200" dirty="0"/>
+              <a:t> function, </a:t>
+            </a:r>
+            <a:r>
+              <a:rPr lang="en-US" sz="2200" i="1" dirty="0" err="1"/>
+              <a:t>AlFilm</a:t>
+            </a:r>
+            <a:r>
+              <a:rPr lang="en-US" sz="2200" dirty="0"/>
+              <a:t> denotes the name that the 3D object will get in COMSOL and postprocessing, </a:t>
+            </a:r>
+            <a:r>
+              <a:rPr lang="en-US" sz="2200" i="1" dirty="0"/>
+              <a:t>i_AlEtch_Polyline003_sketch</a:t>
+            </a:r>
+            <a:r>
+              <a:rPr lang="en-US" sz="2200" dirty="0"/>
+              <a:t> is the name of the 2D object in </a:t>
+            </a:r>
+            <a:r>
+              <a:rPr lang="en-US" sz="2200" dirty="0" err="1"/>
+              <a:t>FreeCAD</a:t>
             </a:r>
             <a:r>
               <a:rPr lang="en-US" sz="2200" dirty="0"/>
               <a:t>, </a:t>
             </a:r>
             <a:r>
-              <a:rPr lang="en-US" sz="2200" dirty="0" err="1"/>
-              <a:t>tunnelGAte</a:t>
+              <a:rPr lang="en-US" sz="2200" i="1" dirty="0"/>
+              <a:t>extrude</a:t>
             </a:r>
             <a:r>
               <a:rPr lang="en-US" sz="2200" dirty="0"/>
-              <a:t>, and </a:t>
-            </a:r>
-            <a:r>
-              <a:rPr lang="en-US" sz="2200" dirty="0" err="1"/>
-              <a:t>alEtch</a:t>
+              <a:t> describes how this object is created, and </a:t>
+            </a:r>
+            <a:r>
+              <a:rPr lang="en-US" sz="2200" i="1" dirty="0" err="1"/>
+              <a:t>metalGate</a:t>
             </a:r>
             <a:r>
               <a:rPr lang="en-US" sz="2200" dirty="0"/>
-              <a:t>). Below </a:t>
-            </a:r>
-            <a:r>
-              <a:rPr lang="en-US" sz="2200" dirty="0" err="1"/>
-              <a:t>alEtch</a:t>
-            </a:r>
-            <a:r>
-              <a:rPr lang="en-US" sz="2200" dirty="0"/>
-              <a:t> is shown as an example. Here, </a:t>
+              <a:t> specifies the physics of the object. </a:t>
             </a:r>
             <a:r>
               <a:rPr lang="en-US" sz="2200" i="1" dirty="0"/>
@@ -19806,28 +19474,28 @@
               <a:t> denotes the offset of the bottom of the object, </a:t>
             </a:r>
             <a:r>
+              <a:rPr lang="en-US" sz="2200" i="1" dirty="0"/>
+              <a:t>thickness</a:t>
+            </a:r>
+            <a:r>
+              <a:rPr lang="en-US" sz="2200" dirty="0"/>
+              <a:t>, </a:t>
+            </a:r>
+            <a:r>
               <a:rPr lang="en-US" sz="2200" i="1" dirty="0" err="1"/>
-              <a:t>deltaz</a:t>
+              <a:t>meshMaxSize</a:t>
             </a:r>
             <a:r>
               <a:rPr lang="en-US" sz="2200" dirty="0"/>
-              <a:t> its height, and </a:t>
-            </a:r>
-            <a:r>
-              <a:rPr lang="en-US" sz="2200" i="1" dirty="0"/>
-              <a:t>label</a:t>
+              <a:t> and </a:t>
+            </a:r>
+            <a:r>
+              <a:rPr lang="en-US" sz="2200" i="1" dirty="0" err="1"/>
+              <a:t>boundaryCondition</a:t>
             </a:r>
             <a:r>
               <a:rPr lang="en-US" sz="2200" dirty="0"/>
-              <a:t> corresponds to the label that the extruded object will get in the generated </a:t>
-            </a:r>
-            <a:r>
-              <a:rPr lang="en-US" sz="2200" dirty="0" err="1"/>
-              <a:t>FreeCAD</a:t>
-            </a:r>
-            <a:r>
-              <a:rPr lang="en-US" sz="2200" dirty="0"/>
-              <a:t> file.</a:t>
+              <a:t> are self-explanatory.</a:t>
             </a:r>
             <a:br>
               <a:rPr lang="en-US" sz="2200" dirty="0"/>
@@ -19835,27 +19503,26 @@
             <a:br>
               <a:rPr lang="en-US" sz="2200" dirty="0"/>
             </a:br>
+            <a:endParaRPr lang="en-US" sz="2200" dirty="0"/>
+          </a:p>
+          <a:p>
+            <a:pPr marL="457200" indent="-457200">
+              <a:buFont typeface="+mj-lt"/>
+              <a:buAutoNum type="arabicPeriod"/>
+            </a:pPr>
             <a:r>
               <a:rPr lang="en-US" sz="2200" dirty="0"/>
-              <a:t>Under </a:t>
-            </a:r>
-            <a:r>
-              <a:rPr lang="en-US" sz="2200" i="1" dirty="0" err="1"/>
-              <a:t>physicsProps</a:t>
-            </a:r>
-            <a:r>
-              <a:rPr lang="en-US" sz="2200" dirty="0"/>
-              <a:t> the different modeling properties of the domain can be added. Here, the domain is a metallic gate made from Aluminum and held at a potential of 0.3 V. The maximum size of the mesh in this domain is set to be 0.01. Later we will also see how to create dielectric, semiconducting, and floating metal objects</a:t>
+              <a:t>Below, examples for adding a semiconductor and a dielectric are given</a:t>
             </a:r>
           </a:p>
         </p:txBody>
       </p:sp>
       <p:pic>
         <p:nvPicPr>
-          <p:cNvPr id="4" name="Picture 3">
+          <p:cNvPr id="2" name="Picture 1">
             <a:extLst>
               <a:ext uri="{FF2B5EF4-FFF2-40B4-BE49-F238E27FC236}">
-                <a16:creationId xmlns:a16="http://schemas.microsoft.com/office/drawing/2014/main" id="{38099582-A6AC-4658-BEB0-AADF9AEDAE3F}"/>
+                <a16:creationId xmlns:a16="http://schemas.microsoft.com/office/drawing/2014/main" id="{3C8BBC6F-2BBB-4B38-B418-3B02B4F72511}"/>
               </a:ext>
             </a:extLst>
           </p:cNvPr>
@@ -19872,8 +19539,38 @@
         </p:blipFill>
         <p:spPr>
           <a:xfrm>
-            <a:off x="6722293" y="5247172"/>
-            <a:ext cx="5184576" cy="1685730"/>
+            <a:off x="2689845" y="4721398"/>
+            <a:ext cx="8362950" cy="381000"/>
+          </a:xfrm>
+          <a:prstGeom prst="rect">
+            <a:avLst/>
+          </a:prstGeom>
+        </p:spPr>
+      </p:pic>
+      <p:pic>
+        <p:nvPicPr>
+          <p:cNvPr id="3" name="Picture 2">
+            <a:extLst>
+              <a:ext uri="{FF2B5EF4-FFF2-40B4-BE49-F238E27FC236}">
+                <a16:creationId xmlns:a16="http://schemas.microsoft.com/office/drawing/2014/main" id="{F896C0FF-6577-4279-83EA-4D94CF32D33C}"/>
+              </a:ext>
+            </a:extLst>
+          </p:cNvPr>
+          <p:cNvPicPr>
+            <a:picLocks noChangeAspect="1"/>
+          </p:cNvPicPr>
+          <p:nvPr/>
+        </p:nvPicPr>
+        <p:blipFill>
+          <a:blip r:embed="rId4"/>
+          <a:stretch>
+            <a:fillRect/>
+          </a:stretch>
+        </p:blipFill>
+        <p:spPr>
+          <a:xfrm>
+            <a:off x="2689845" y="5685029"/>
+            <a:ext cx="5133975" cy="1095375"/>
           </a:xfrm>
           <a:prstGeom prst="rect">
             <a:avLst/>
@@ -19918,378 +19615,6 @@
           <a:chExt cx="0" cy="0"/>
         </a:xfrm>
       </p:grpSpPr>
-      <p:sp>
-        <p:nvSpPr>
-          <p:cNvPr id="17" name="Title 16"/>
-          <p:cNvSpPr>
-            <a:spLocks noGrp="1"/>
-          </p:cNvSpPr>
-          <p:nvPr>
-            <p:ph type="title"/>
-          </p:nvPr>
-        </p:nvSpPr>
-        <p:spPr/>
-        <p:txBody>
-          <a:bodyPr/>
-          <a:lstStyle/>
-          <a:p>
-            <a:r>
-              <a:rPr lang="en-US" dirty="0"/>
-              <a:t>Creating a heterostructure</a:t>
-            </a:r>
-          </a:p>
-        </p:txBody>
-      </p:sp>
-      <p:sp>
-        <p:nvSpPr>
-          <p:cNvPr id="6" name="Text Placeholder 5"/>
-          <p:cNvSpPr>
-            <a:spLocks noGrp="1"/>
-          </p:cNvSpPr>
-          <p:nvPr>
-            <p:ph type="body" sz="quarter" idx="10"/>
-          </p:nvPr>
-        </p:nvSpPr>
-        <p:spPr>
-          <a:xfrm>
-            <a:off x="313582" y="1697062"/>
-            <a:ext cx="5976663" cy="2757678"/>
-          </a:xfrm>
-        </p:spPr>
-        <p:txBody>
-          <a:bodyPr/>
-          <a:lstStyle/>
-          <a:p>
-            <a:r>
-              <a:rPr lang="en-US" sz="2200" dirty="0"/>
-              <a:t>Besides our gates, the device we are modeling also consists of a stack of materials. From top to bottom: substrate, barrier, semiconductor, barrier, </a:t>
-            </a:r>
-            <a:r>
-              <a:rPr lang="en-US" sz="2200" dirty="0" err="1"/>
-              <a:t>dielecric</a:t>
-            </a:r>
-            <a:r>
-              <a:rPr lang="en-US" sz="2200" dirty="0"/>
-              <a:t>, air. This stack is defined in the stack dictionary shown on the right</a:t>
-            </a:r>
-          </a:p>
-          <a:p>
-            <a:endParaRPr lang="en-US" sz="2200" dirty="0"/>
-          </a:p>
-          <a:p>
-            <a:r>
-              <a:rPr lang="en-US" sz="2200" dirty="0"/>
-              <a:t>This figure also shows the way to add dielectric and semiconducting domains </a:t>
-            </a:r>
-          </a:p>
-        </p:txBody>
-      </p:sp>
-      <p:pic>
-        <p:nvPicPr>
-          <p:cNvPr id="2" name="Picture 1">
-            <a:extLst>
-              <a:ext uri="{FF2B5EF4-FFF2-40B4-BE49-F238E27FC236}">
-                <a16:creationId xmlns:a16="http://schemas.microsoft.com/office/drawing/2014/main" id="{75BB6394-65B5-4106-B56C-A2847ED5ED5B}"/>
-              </a:ext>
-            </a:extLst>
-          </p:cNvPr>
-          <p:cNvPicPr>
-            <a:picLocks noChangeAspect="1"/>
-          </p:cNvPicPr>
-          <p:nvPr/>
-        </p:nvPicPr>
-        <p:blipFill>
-          <a:blip r:embed="rId3"/>
-          <a:stretch>
-            <a:fillRect/>
-          </a:stretch>
-        </p:blipFill>
-        <p:spPr>
-          <a:xfrm>
-            <a:off x="6290245" y="1697170"/>
-            <a:ext cx="5961581" cy="4084614"/>
-          </a:xfrm>
-          <a:prstGeom prst="rect">
-            <a:avLst/>
-          </a:prstGeom>
-        </p:spPr>
-      </p:pic>
-    </p:spTree>
-    <p:extLst>
-      <p:ext uri="{BB962C8B-B14F-4D97-AF65-F5344CB8AC3E}">
-        <p14:creationId xmlns:p14="http://schemas.microsoft.com/office/powerpoint/2010/main" val="3185601111"/>
-      </p:ext>
-    </p:extLst>
-  </p:cSld>
-  <p:clrMapOvr>
-    <a:masterClrMapping/>
-  </p:clrMapOvr>
-  <mc:AlternateContent xmlns:mc="http://schemas.openxmlformats.org/markup-compatibility/2006" xmlns:p14="http://schemas.microsoft.com/office/powerpoint/2010/main">
-    <mc:Choice Requires="p14">
-      <p:transition p14:dur="0"/>
-    </mc:Choice>
-    <mc:Fallback xmlns="">
-      <p:transition/>
-    </mc:Fallback>
-  </mc:AlternateContent>
-</p:sld>
-</file>
-
-<file path=ppt/slides/slide17.xml><?xml version="1.0" encoding="utf-8"?>
-<p:sld xmlns:a="http://schemas.openxmlformats.org/drawingml/2006/main" xmlns:r="http://schemas.openxmlformats.org/officeDocument/2006/relationships" xmlns:p="http://schemas.openxmlformats.org/presentationml/2006/main">
-  <p:cSld>
-    <p:spTree>
-      <p:nvGrpSpPr>
-        <p:cNvPr id="1" name=""/>
-        <p:cNvGrpSpPr/>
-        <p:nvPr/>
-      </p:nvGrpSpPr>
-      <p:grpSpPr>
-        <a:xfrm>
-          <a:off x="0" y="0"/>
-          <a:ext cx="0" cy="0"/>
-          <a:chOff x="0" y="0"/>
-          <a:chExt cx="0" cy="0"/>
-        </a:xfrm>
-      </p:grpSpPr>
-      <p:sp>
-        <p:nvSpPr>
-          <p:cNvPr id="17" name="Title 16"/>
-          <p:cNvSpPr>
-            <a:spLocks noGrp="1"/>
-          </p:cNvSpPr>
-          <p:nvPr>
-            <p:ph type="title"/>
-          </p:nvPr>
-        </p:nvSpPr>
-        <p:spPr/>
-        <p:txBody>
-          <a:bodyPr/>
-          <a:lstStyle/>
-          <a:p>
-            <a:r>
-              <a:rPr lang="en-US" dirty="0"/>
-              <a:t>Adding extrusion information to </a:t>
-            </a:r>
-            <a:r>
-              <a:rPr lang="en-US" dirty="0" err="1"/>
-              <a:t>model.json</a:t>
-            </a:r>
-            <a:endParaRPr lang="en-US" dirty="0"/>
-          </a:p>
-        </p:txBody>
-      </p:sp>
-      <p:sp>
-        <p:nvSpPr>
-          <p:cNvPr id="6" name="Text Placeholder 5"/>
-          <p:cNvSpPr>
-            <a:spLocks noGrp="1"/>
-          </p:cNvSpPr>
-          <p:nvPr>
-            <p:ph type="body" sz="quarter" idx="10"/>
-          </p:nvPr>
-        </p:nvSpPr>
-        <p:spPr>
-          <a:xfrm>
-            <a:off x="313582" y="1697062"/>
-            <a:ext cx="11305255" cy="1708160"/>
-          </a:xfrm>
-        </p:spPr>
-        <p:txBody>
-          <a:bodyPr/>
-          <a:lstStyle/>
-          <a:p>
-            <a:r>
-              <a:rPr lang="en-US" sz="2200" dirty="0"/>
-              <a:t>Finally, we need to tell </a:t>
-            </a:r>
-            <a:r>
-              <a:rPr lang="en-US" sz="2200" dirty="0" err="1"/>
-              <a:t>FreeCAD</a:t>
-            </a:r>
-            <a:r>
-              <a:rPr lang="en-US" sz="2200" dirty="0"/>
-              <a:t> to which 2D objects the extrusions that we have just defined correspond. To do this, we store the previously-generated dictionaries in </a:t>
-            </a:r>
-            <a:r>
-              <a:rPr lang="en-US" sz="2200" dirty="0" err="1"/>
-              <a:t>runModel.modelDict</a:t>
-            </a:r>
-            <a:r>
-              <a:rPr lang="en-US" sz="2200" dirty="0"/>
-              <a:t>[‘</a:t>
-            </a:r>
-            <a:r>
-              <a:rPr lang="en-US" sz="2200" dirty="0" err="1"/>
-              <a:t>freeCADInfo</a:t>
-            </a:r>
-            <a:r>
-              <a:rPr lang="en-US" sz="2200" dirty="0"/>
-              <a:t>’][</a:t>
-            </a:r>
-            <a:r>
-              <a:rPr lang="en-US" sz="2200" i="1" dirty="0" err="1"/>
-              <a:t>objectName</a:t>
-            </a:r>
-            <a:r>
-              <a:rPr lang="en-US" sz="2200" dirty="0"/>
-              <a:t>], where </a:t>
-            </a:r>
-            <a:r>
-              <a:rPr lang="en-US" sz="2200" i="1" dirty="0" err="1"/>
-              <a:t>objectName</a:t>
-            </a:r>
-            <a:r>
-              <a:rPr lang="en-US" sz="2200" dirty="0"/>
-              <a:t> is the name (not label!) of the 2D sketch in </a:t>
-            </a:r>
-            <a:r>
-              <a:rPr lang="en-US" sz="2200" dirty="0" err="1"/>
-              <a:t>FreeCAD</a:t>
-            </a:r>
-            <a:r>
-              <a:rPr lang="en-US" sz="2200" dirty="0"/>
-              <a:t> to which the dictionary corresponds. To get the name of a sketch, select the sketch in </a:t>
-            </a:r>
-            <a:r>
-              <a:rPr lang="en-US" sz="2200" dirty="0" err="1"/>
-              <a:t>FreeCAD</a:t>
-            </a:r>
-            <a:r>
-              <a:rPr lang="en-US" sz="2200" dirty="0"/>
-              <a:t> and run the </a:t>
-            </a:r>
-            <a:r>
-              <a:rPr lang="en-US" sz="2200" dirty="0" err="1"/>
-              <a:t>WriteFreeCADNames</a:t>
-            </a:r>
-            <a:r>
-              <a:rPr lang="en-US" sz="2200" dirty="0"/>
-              <a:t> macro. </a:t>
-            </a:r>
-          </a:p>
-        </p:txBody>
-      </p:sp>
-      <p:pic>
-        <p:nvPicPr>
-          <p:cNvPr id="3" name="Picture 2">
-            <a:extLst>
-              <a:ext uri="{FF2B5EF4-FFF2-40B4-BE49-F238E27FC236}">
-                <a16:creationId xmlns:a16="http://schemas.microsoft.com/office/drawing/2014/main" id="{B617B427-480F-4989-B014-E7EA476FB0CD}"/>
-              </a:ext>
-            </a:extLst>
-          </p:cNvPr>
-          <p:cNvPicPr>
-            <a:picLocks noChangeAspect="1"/>
-          </p:cNvPicPr>
-          <p:nvPr/>
-        </p:nvPicPr>
-        <p:blipFill>
-          <a:blip r:embed="rId3"/>
-          <a:stretch>
-            <a:fillRect/>
-          </a:stretch>
-        </p:blipFill>
-        <p:spPr>
-          <a:xfrm>
-            <a:off x="2473821" y="3608681"/>
-            <a:ext cx="6563097" cy="866625"/>
-          </a:xfrm>
-          <a:prstGeom prst="rect">
-            <a:avLst/>
-          </a:prstGeom>
-        </p:spPr>
-      </p:pic>
-    </p:spTree>
-    <p:extLst>
-      <p:ext uri="{BB962C8B-B14F-4D97-AF65-F5344CB8AC3E}">
-        <p14:creationId xmlns:p14="http://schemas.microsoft.com/office/powerpoint/2010/main" val="976386266"/>
-      </p:ext>
-    </p:extLst>
-  </p:cSld>
-  <p:clrMapOvr>
-    <a:masterClrMapping/>
-  </p:clrMapOvr>
-  <mc:AlternateContent xmlns:mc="http://schemas.openxmlformats.org/markup-compatibility/2006" xmlns:p14="http://schemas.microsoft.com/office/powerpoint/2010/main">
-    <mc:Choice Requires="p14">
-      <p:transition p14:dur="0"/>
-    </mc:Choice>
-    <mc:Fallback xmlns="">
-      <p:transition/>
-    </mc:Fallback>
-  </mc:AlternateContent>
-</p:sld>
-</file>
-
-<file path=ppt/slides/slide18.xml><?xml version="1.0" encoding="utf-8"?>
-<p:sld xmlns:a="http://schemas.openxmlformats.org/drawingml/2006/main" xmlns:r="http://schemas.openxmlformats.org/officeDocument/2006/relationships" xmlns:p="http://schemas.openxmlformats.org/presentationml/2006/main">
-  <p:cSld>
-    <p:spTree>
-      <p:nvGrpSpPr>
-        <p:cNvPr id="1" name=""/>
-        <p:cNvGrpSpPr/>
-        <p:nvPr/>
-      </p:nvGrpSpPr>
-      <p:grpSpPr>
-        <a:xfrm>
-          <a:off x="0" y="0"/>
-          <a:ext cx="0" cy="0"/>
-          <a:chOff x="0" y="0"/>
-          <a:chExt cx="0" cy="0"/>
-        </a:xfrm>
-      </p:grpSpPr>
-      <p:sp>
-        <p:nvSpPr>
-          <p:cNvPr id="17" name="Title 16"/>
-          <p:cNvSpPr>
-            <a:spLocks noGrp="1"/>
-          </p:cNvSpPr>
-          <p:nvPr>
-            <p:ph type="title"/>
-          </p:nvPr>
-        </p:nvSpPr>
-        <p:spPr/>
-        <p:txBody>
-          <a:bodyPr/>
-          <a:lstStyle/>
-          <a:p>
-            <a:r>
-              <a:rPr lang="en-US" dirty="0"/>
-              <a:t>Sweeps and jobs</a:t>
-            </a:r>
-          </a:p>
-        </p:txBody>
-      </p:sp>
-      <p:pic>
-        <p:nvPicPr>
-          <p:cNvPr id="4" name="Picture 3">
-            <a:extLst>
-              <a:ext uri="{FF2B5EF4-FFF2-40B4-BE49-F238E27FC236}">
-                <a16:creationId xmlns:a16="http://schemas.microsoft.com/office/drawing/2014/main" id="{5FE21127-68B4-4295-A745-2E9CA7FB2664}"/>
-              </a:ext>
-            </a:extLst>
-          </p:cNvPr>
-          <p:cNvPicPr>
-            <a:picLocks noChangeAspect="1"/>
-          </p:cNvPicPr>
-          <p:nvPr/>
-        </p:nvPicPr>
-        <p:blipFill>
-          <a:blip r:embed="rId3"/>
-          <a:stretch>
-            <a:fillRect/>
-          </a:stretch>
-        </p:blipFill>
-        <p:spPr>
-          <a:xfrm>
-            <a:off x="1897757" y="4073326"/>
-            <a:ext cx="6624736" cy="239879"/>
-          </a:xfrm>
-          <a:prstGeom prst="rect">
-            <a:avLst/>
-          </a:prstGeom>
-        </p:spPr>
-      </p:pic>
       <p:sp>
         <p:nvSpPr>
           <p:cNvPr id="8" name="Text Placeholder 5">
@@ -20565,12 +19890,34 @@
           </a:p>
         </p:txBody>
       </p:sp>
+      <p:sp>
+        <p:nvSpPr>
+          <p:cNvPr id="17" name="Title 16"/>
+          <p:cNvSpPr>
+            <a:spLocks noGrp="1"/>
+          </p:cNvSpPr>
+          <p:nvPr>
+            <p:ph type="title"/>
+          </p:nvPr>
+        </p:nvSpPr>
+        <p:spPr/>
+        <p:txBody>
+          <a:bodyPr/>
+          <a:lstStyle/>
+          <a:p>
+            <a:r>
+              <a:rPr lang="en-US" dirty="0"/>
+              <a:t>Sweeps and jobs</a:t>
+            </a:r>
+          </a:p>
+        </p:txBody>
+      </p:sp>
       <p:pic>
         <p:nvPicPr>
-          <p:cNvPr id="7" name="Picture 6">
+          <p:cNvPr id="2" name="Picture 1">
             <a:extLst>
               <a:ext uri="{FF2B5EF4-FFF2-40B4-BE49-F238E27FC236}">
-                <a16:creationId xmlns:a16="http://schemas.microsoft.com/office/drawing/2014/main" id="{DB99504A-6711-4353-AA39-35F852C9D25B}"/>
+                <a16:creationId xmlns:a16="http://schemas.microsoft.com/office/drawing/2014/main" id="{28358E10-557E-407F-81E8-AC7CC2954C90}"/>
               </a:ext>
             </a:extLst>
           </p:cNvPr>
@@ -20580,45 +19927,15 @@
           <p:nvPr/>
         </p:nvPicPr>
         <p:blipFill>
-          <a:blip r:embed="rId4"/>
+          <a:blip r:embed="rId3"/>
           <a:stretch>
             <a:fillRect/>
           </a:stretch>
         </p:blipFill>
         <p:spPr>
           <a:xfrm>
-            <a:off x="1897757" y="3203666"/>
-            <a:ext cx="7128792" cy="587191"/>
-          </a:xfrm>
-          <a:prstGeom prst="rect">
-            <a:avLst/>
-          </a:prstGeom>
-        </p:spPr>
-      </p:pic>
-      <p:pic>
-        <p:nvPicPr>
-          <p:cNvPr id="9" name="Picture 8">
-            <a:extLst>
-              <a:ext uri="{FF2B5EF4-FFF2-40B4-BE49-F238E27FC236}">
-                <a16:creationId xmlns:a16="http://schemas.microsoft.com/office/drawing/2014/main" id="{5DD6AA63-88E2-45FC-A0C4-1673FCBAC71F}"/>
-              </a:ext>
-            </a:extLst>
-          </p:cNvPr>
-          <p:cNvPicPr>
-            <a:picLocks noChangeAspect="1"/>
-          </p:cNvPicPr>
-          <p:nvPr/>
-        </p:nvPicPr>
-        <p:blipFill>
-          <a:blip r:embed="rId5"/>
-          <a:stretch>
-            <a:fillRect/>
-          </a:stretch>
-        </p:blipFill>
-        <p:spPr>
-          <a:xfrm>
-            <a:off x="1969765" y="4437734"/>
-            <a:ext cx="6358152" cy="2265885"/>
+            <a:off x="1955653" y="3205991"/>
+            <a:ext cx="5753100" cy="247650"/>
           </a:xfrm>
           <a:prstGeom prst="rect">
             <a:avLst/>
@@ -20646,7 +19963,7 @@
 </p:sld>
 </file>
 
-<file path=ppt/slides/slide19.xml><?xml version="1.0" encoding="utf-8"?>
+<file path=ppt/slides/slide17.xml><?xml version="1.0" encoding="utf-8"?>
 <p:sld xmlns:a="http://schemas.openxmlformats.org/drawingml/2006/main" xmlns:r="http://schemas.openxmlformats.org/officeDocument/2006/relationships" xmlns:p="http://schemas.openxmlformats.org/presentationml/2006/main">
   <p:cSld>
     <p:spTree>
@@ -20680,7 +19997,7 @@
         <p:spPr>
           <a:xfrm>
             <a:off x="313581" y="1697062"/>
-            <a:ext cx="11888787" cy="3942618"/>
+            <a:ext cx="11888787" cy="3877985"/>
           </a:xfrm>
           <a:prstGeom prst="rect">
             <a:avLst/>
@@ -20918,56 +20235,80 @@
               <a:buAutoNum type="arabicPeriod"/>
             </a:pPr>
             <a:r>
-              <a:rPr lang="en-US" sz="2200" dirty="0"/>
+              <a:rPr lang="en-US" sz="2000" dirty="0"/>
               <a:t>Now, we need to finalize the model (left figure): the paths that we defined earlier need to be added to the </a:t>
             </a:r>
             <a:r>
-              <a:rPr lang="en-US" sz="2200" dirty="0" err="1"/>
+              <a:rPr lang="en-US" sz="2000" dirty="0" err="1"/>
               <a:t>json</a:t>
             </a:r>
             <a:r>
-              <a:rPr lang="en-US" sz="2200" dirty="0"/>
-              <a:t> file, we need to generate some minimal information for COMSOL, and we need to create a job. A job has a </a:t>
-            </a:r>
-            <a:r>
-              <a:rPr lang="en-US" sz="2200" dirty="0" err="1"/>
+              <a:rPr lang="en-US" sz="2000" dirty="0"/>
+              <a:t> file, we need to generate some minimal information for COMSOL, and we need to create a job. The job here has a </a:t>
+            </a:r>
+            <a:r>
+              <a:rPr lang="en-US" sz="2000" dirty="0" err="1"/>
               <a:t>jobsequence</a:t>
             </a:r>
             <a:r>
-              <a:rPr lang="en-US" sz="2200" dirty="0"/>
+              <a:rPr lang="en-US" sz="2000" dirty="0"/>
               <a:t> consisting of ‘</a:t>
             </a:r>
             <a:r>
-              <a:rPr lang="en-US" sz="2200" dirty="0" err="1"/>
+              <a:rPr lang="en-US" sz="2000" dirty="0" err="1"/>
               <a:t>geoGen</a:t>
             </a:r>
             <a:r>
-              <a:rPr lang="en-US" sz="2200" dirty="0"/>
+              <a:rPr lang="en-US" sz="2000" dirty="0"/>
               <a:t>’ (generation of the 3D </a:t>
             </a:r>
             <a:r>
-              <a:rPr lang="en-US" sz="2200" dirty="0" err="1"/>
+              <a:rPr lang="en-US" sz="2000" dirty="0" err="1"/>
               <a:t>FreeCAD</a:t>
             </a:r>
             <a:r>
-              <a:rPr lang="en-US" sz="2200" dirty="0"/>
+              <a:rPr lang="en-US" sz="2000" dirty="0"/>
               <a:t> model, the different CAD parts, </a:t>
             </a:r>
             <a:r>
-              <a:rPr lang="en-US" sz="2200" dirty="0" err="1"/>
+              <a:rPr lang="en-US" sz="2000" dirty="0" err="1"/>
               <a:t>etc</a:t>
             </a:r>
             <a:r>
-              <a:rPr lang="en-US" sz="2200" dirty="0"/>
+              <a:rPr lang="en-US" sz="2000" dirty="0"/>
               <a:t>), and ‘</a:t>
             </a:r>
             <a:r>
-              <a:rPr lang="en-US" sz="2200" dirty="0" err="1"/>
+              <a:rPr lang="en-US" sz="2000" dirty="0" err="1"/>
               <a:t>comsolRun</a:t>
             </a:r>
             <a:r>
-              <a:rPr lang="en-US" sz="2200" dirty="0"/>
-              <a:t>’, in which the actual analysis is carrier out.</a:t>
+              <a:rPr lang="en-US" sz="2000" dirty="0"/>
+              <a:t>’, in which the actual analysis is carrier out.  </a:t>
+            </a:r>
+            <a:r>
+              <a:rPr lang="en-US" sz="2000" dirty="0" err="1"/>
+              <a:t>exportScalingVec</a:t>
+            </a:r>
+            <a:r>
+              <a:rPr lang="en-US" sz="2000" dirty="0"/>
+              <a:t> determines the resolution of the exported solution, and </a:t>
+            </a:r>
+            <a:r>
+              <a:rPr lang="en-US" sz="2000" dirty="0" err="1"/>
+              <a:t>comsolRunMode</a:t>
+            </a:r>
+            <a:r>
+              <a:rPr lang="en-US" sz="2000" dirty="0"/>
+              <a:t> can be either batch, </a:t>
+            </a:r>
+            <a:r>
+              <a:rPr lang="en-US" sz="2000" dirty="0" err="1"/>
+              <a:t>norun</a:t>
+            </a:r>
+            <a:r>
+              <a:rPr lang="en-US" sz="2000" dirty="0"/>
+              <a:t>, or debug. In the last mode, an .mph file with solutions for manual inspection is generated</a:t>
             </a:r>
           </a:p>
           <a:p>
@@ -20976,25 +20317,25 @@
               <a:buAutoNum type="arabicPeriod"/>
             </a:pPr>
             <a:r>
-              <a:rPr lang="en-US" sz="2200" dirty="0"/>
+              <a:rPr lang="en-US" sz="2000" dirty="0"/>
               <a:t>Finally, we run the model (right figure)</a:t>
             </a:r>
           </a:p>
           <a:p>
-            <a:endParaRPr lang="en-US" sz="2200" dirty="0"/>
-          </a:p>
-          <a:p>
-            <a:endParaRPr lang="en-US" sz="2200" dirty="0"/>
-          </a:p>
-          <a:p>
-            <a:endParaRPr lang="en-US" sz="2200" dirty="0"/>
-          </a:p>
-          <a:p>
-            <a:endParaRPr lang="en-US" sz="2200" dirty="0"/>
-          </a:p>
-          <a:p>
-            <a:r>
-              <a:rPr lang="en-US" sz="2200" dirty="0"/>
+            <a:endParaRPr lang="en-US" sz="2000" dirty="0"/>
+          </a:p>
+          <a:p>
+            <a:endParaRPr lang="en-US" sz="2000" dirty="0"/>
+          </a:p>
+          <a:p>
+            <a:endParaRPr lang="en-US" sz="2000" dirty="0"/>
+          </a:p>
+          <a:p>
+            <a:endParaRPr lang="en-US" sz="2000" dirty="0"/>
+          </a:p>
+          <a:p>
+            <a:r>
+              <a:rPr lang="en-US" sz="2000" dirty="0"/>
               <a:t> </a:t>
             </a:r>
           </a:p>
@@ -21024,10 +20365,10 @@
       </p:sp>
       <p:pic>
         <p:nvPicPr>
-          <p:cNvPr id="9" name="Picture 8">
+          <p:cNvPr id="5" name="Picture 4">
             <a:extLst>
               <a:ext uri="{FF2B5EF4-FFF2-40B4-BE49-F238E27FC236}">
-                <a16:creationId xmlns:a16="http://schemas.microsoft.com/office/drawing/2014/main" id="{5DD6AA63-88E2-45FC-A0C4-1673FCBAC71F}"/>
+                <a16:creationId xmlns:a16="http://schemas.microsoft.com/office/drawing/2014/main" id="{030884D2-F15D-40CF-9BEE-8E1DFA69111A}"/>
               </a:ext>
             </a:extLst>
           </p:cNvPr>
@@ -21044,8 +20385,8 @@
         </p:blipFill>
         <p:spPr>
           <a:xfrm>
-            <a:off x="457597" y="4448484"/>
-            <a:ext cx="6358152" cy="2265885"/>
+            <a:off x="7370365" y="3857302"/>
+            <a:ext cx="2933700" cy="981075"/>
           </a:xfrm>
           <a:prstGeom prst="rect">
             <a:avLst/>
@@ -21054,10 +20395,10 @@
       </p:pic>
       <p:pic>
         <p:nvPicPr>
-          <p:cNvPr id="2" name="Picture 1">
+          <p:cNvPr id="6" name="Picture 5">
             <a:extLst>
               <a:ext uri="{FF2B5EF4-FFF2-40B4-BE49-F238E27FC236}">
-                <a16:creationId xmlns:a16="http://schemas.microsoft.com/office/drawing/2014/main" id="{CA9B3C4B-D210-4226-8E20-DE2725277EE5}"/>
+                <a16:creationId xmlns:a16="http://schemas.microsoft.com/office/drawing/2014/main" id="{8F2B561E-4FB5-4263-9D84-9777761B1D3E}"/>
               </a:ext>
             </a:extLst>
           </p:cNvPr>
@@ -21074,8 +20415,8 @@
         </p:blipFill>
         <p:spPr>
           <a:xfrm>
-            <a:off x="7586389" y="4448484"/>
-            <a:ext cx="4291013" cy="952500"/>
+            <a:off x="961652" y="3857302"/>
+            <a:ext cx="4724400" cy="2952750"/>
           </a:xfrm>
           <a:prstGeom prst="rect">
             <a:avLst/>
@@ -21103,80 +20444,7 @@
 </p:sld>
 </file>
 
-<file path=ppt/slides/slide2.xml><?xml version="1.0" encoding="utf-8"?>
-<p:sld xmlns:a="http://schemas.openxmlformats.org/drawingml/2006/main" xmlns:r="http://schemas.openxmlformats.org/officeDocument/2006/relationships" xmlns:p="http://schemas.openxmlformats.org/presentationml/2006/main">
-  <p:cSld>
-    <p:spTree>
-      <p:nvGrpSpPr>
-        <p:cNvPr id="1" name=""/>
-        <p:cNvGrpSpPr/>
-        <p:nvPr/>
-      </p:nvGrpSpPr>
-      <p:grpSpPr>
-        <a:xfrm>
-          <a:off x="0" y="0"/>
-          <a:ext cx="0" cy="0"/>
-          <a:chOff x="0" y="0"/>
-          <a:chExt cx="0" cy="0"/>
-        </a:xfrm>
-      </p:grpSpPr>
-      <p:sp>
-        <p:nvSpPr>
-          <p:cNvPr id="17" name="Title 16"/>
-          <p:cNvSpPr>
-            <a:spLocks noGrp="1"/>
-          </p:cNvSpPr>
-          <p:nvPr>
-            <p:ph type="title"/>
-          </p:nvPr>
-        </p:nvSpPr>
-        <p:spPr>
-          <a:xfrm>
-            <a:off x="274639" y="3038474"/>
-            <a:ext cx="11889564" cy="917575"/>
-          </a:xfrm>
-        </p:spPr>
-        <p:txBody>
-          <a:bodyPr/>
-          <a:lstStyle/>
-          <a:p>
-            <a:r>
-              <a:rPr lang="en-US" dirty="0"/>
-              <a:t>Part 1 : Set up the </a:t>
-            </a:r>
-            <a:r>
-              <a:rPr lang="en-US" dirty="0" err="1"/>
-              <a:t>FreeCAD</a:t>
-            </a:r>
-            <a:r>
-              <a:rPr lang="en-US" dirty="0"/>
-              <a:t> model</a:t>
-            </a:r>
-          </a:p>
-        </p:txBody>
-      </p:sp>
-    </p:spTree>
-    <p:extLst>
-      <p:ext uri="{BB962C8B-B14F-4D97-AF65-F5344CB8AC3E}">
-        <p14:creationId xmlns:p14="http://schemas.microsoft.com/office/powerpoint/2010/main" val="2024239716"/>
-      </p:ext>
-    </p:extLst>
-  </p:cSld>
-  <p:clrMapOvr>
-    <a:masterClrMapping/>
-  </p:clrMapOvr>
-  <mc:AlternateContent xmlns:mc="http://schemas.openxmlformats.org/markup-compatibility/2006" xmlns:p14="http://schemas.microsoft.com/office/powerpoint/2010/main">
-    <mc:Choice Requires="p14">
-      <p:transition p14:dur="0"/>
-    </mc:Choice>
-    <mc:Fallback xmlns="">
-      <p:transition/>
-    </mc:Fallback>
-  </mc:AlternateContent>
-</p:sld>
-</file>
-
-<file path=ppt/slides/slide20.xml><?xml version="1.0" encoding="utf-8"?>
+<file path=ppt/slides/slide18.xml><?xml version="1.0" encoding="utf-8"?>
 <p:sld xmlns:a="http://schemas.openxmlformats.org/drawingml/2006/main" xmlns:r="http://schemas.openxmlformats.org/officeDocument/2006/relationships" xmlns:p="http://schemas.openxmlformats.org/presentationml/2006/main">
   <p:cSld>
     <p:spTree>
@@ -21241,7 +20509,7 @@
 </p:sld>
 </file>
 
-<file path=ppt/slides/slide21.xml><?xml version="1.0" encoding="utf-8"?>
+<file path=ppt/slides/slide19.xml><?xml version="1.0" encoding="utf-8"?>
 <p:sld xmlns:a="http://schemas.openxmlformats.org/drawingml/2006/main" xmlns:r="http://schemas.openxmlformats.org/officeDocument/2006/relationships" xmlns:p="http://schemas.openxmlformats.org/presentationml/2006/main">
   <p:cSld>
     <p:spTree>
@@ -21352,7 +20620,7 @@
         <p:spPr>
           <a:xfrm>
             <a:off x="3481933" y="3209230"/>
-            <a:ext cx="8682270" cy="2723823"/>
+            <a:ext cx="8682270" cy="3028521"/>
           </a:xfrm>
           <a:prstGeom prst="rect">
             <a:avLst/>
@@ -21631,7 +20899,7 @@
             </a:r>
             <a:r>
               <a:rPr lang="en-US" sz="1800" dirty="0"/>
-              <a:t>all generated 3D objects in STEP format</a:t>
+              <a:t>all generated 3D objects in STL format</a:t>
             </a:r>
           </a:p>
           <a:p>
@@ -21663,7 +20931,29 @@
             </a:r>
             <a:r>
               <a:rPr lang="en-US" sz="1800" dirty="0"/>
-              <a:t>COMSOL model file</a:t>
+              <a:t>COMSOL model file in java</a:t>
+            </a:r>
+          </a:p>
+          <a:p>
+            <a:r>
+              <a:rPr lang="en-US" sz="1800" b="1" dirty="0" err="1"/>
+              <a:t>comsolModel_Model.mph</a:t>
+            </a:r>
+            <a:r>
+              <a:rPr lang="en-US" sz="1800" b="1" dirty="0"/>
+              <a:t>:</a:t>
+            </a:r>
+            <a:r>
+              <a:rPr lang="en-US" sz="1800" dirty="0"/>
+              <a:t> The COMSOL file with solutions. Generated in </a:t>
+            </a:r>
+            <a:r>
+              <a:rPr lang="en-US" sz="1800" i="1" dirty="0"/>
+              <a:t>debug</a:t>
+            </a:r>
+            <a:r>
+              <a:rPr lang="en-US" sz="1800" dirty="0"/>
+              <a:t> mode</a:t>
             </a:r>
           </a:p>
           <a:p>
@@ -21710,10 +21000,10 @@
       </p:sp>
       <p:pic>
         <p:nvPicPr>
-          <p:cNvPr id="5" name="Picture 4">
+          <p:cNvPr id="2" name="Picture 1">
             <a:extLst>
               <a:ext uri="{FF2B5EF4-FFF2-40B4-BE49-F238E27FC236}">
-                <a16:creationId xmlns:a16="http://schemas.microsoft.com/office/drawing/2014/main" id="{8143E6B7-4AE9-40F3-B1DF-41B4F34B6571}"/>
+                <a16:creationId xmlns:a16="http://schemas.microsoft.com/office/drawing/2014/main" id="{E7768BE2-0EE9-4D29-8F72-82BF48FAF340}"/>
               </a:ext>
             </a:extLst>
           </p:cNvPr>
@@ -21730,8 +21020,8 @@
         </p:blipFill>
         <p:spPr>
           <a:xfrm>
-            <a:off x="745629" y="3357107"/>
-            <a:ext cx="2323086" cy="2444502"/>
+            <a:off x="457597" y="2975339"/>
+            <a:ext cx="2413775" cy="3330235"/>
           </a:xfrm>
           <a:prstGeom prst="rect">
             <a:avLst/>
@@ -21759,7 +21049,80 @@
 </p:sld>
 </file>
 
-<file path=ppt/slides/slide22.xml><?xml version="1.0" encoding="utf-8"?>
+<file path=ppt/slides/slide2.xml><?xml version="1.0" encoding="utf-8"?>
+<p:sld xmlns:a="http://schemas.openxmlformats.org/drawingml/2006/main" xmlns:r="http://schemas.openxmlformats.org/officeDocument/2006/relationships" xmlns:p="http://schemas.openxmlformats.org/presentationml/2006/main">
+  <p:cSld>
+    <p:spTree>
+      <p:nvGrpSpPr>
+        <p:cNvPr id="1" name=""/>
+        <p:cNvGrpSpPr/>
+        <p:nvPr/>
+      </p:nvGrpSpPr>
+      <p:grpSpPr>
+        <a:xfrm>
+          <a:off x="0" y="0"/>
+          <a:ext cx="0" cy="0"/>
+          <a:chOff x="0" y="0"/>
+          <a:chExt cx="0" cy="0"/>
+        </a:xfrm>
+      </p:grpSpPr>
+      <p:sp>
+        <p:nvSpPr>
+          <p:cNvPr id="17" name="Title 16"/>
+          <p:cNvSpPr>
+            <a:spLocks noGrp="1"/>
+          </p:cNvSpPr>
+          <p:nvPr>
+            <p:ph type="title"/>
+          </p:nvPr>
+        </p:nvSpPr>
+        <p:spPr>
+          <a:xfrm>
+            <a:off x="274639" y="3038474"/>
+            <a:ext cx="11889564" cy="917575"/>
+          </a:xfrm>
+        </p:spPr>
+        <p:txBody>
+          <a:bodyPr/>
+          <a:lstStyle/>
+          <a:p>
+            <a:r>
+              <a:rPr lang="en-US" dirty="0"/>
+              <a:t>Part 1 : Set up the </a:t>
+            </a:r>
+            <a:r>
+              <a:rPr lang="en-US" dirty="0" err="1"/>
+              <a:t>FreeCAD</a:t>
+            </a:r>
+            <a:r>
+              <a:rPr lang="en-US" dirty="0"/>
+              <a:t> model</a:t>
+            </a:r>
+          </a:p>
+        </p:txBody>
+      </p:sp>
+    </p:spTree>
+    <p:extLst>
+      <p:ext uri="{BB962C8B-B14F-4D97-AF65-F5344CB8AC3E}">
+        <p14:creationId xmlns:p14="http://schemas.microsoft.com/office/powerpoint/2010/main" val="2024239716"/>
+      </p:ext>
+    </p:extLst>
+  </p:cSld>
+  <p:clrMapOvr>
+    <a:masterClrMapping/>
+  </p:clrMapOvr>
+  <mc:AlternateContent xmlns:mc="http://schemas.openxmlformats.org/markup-compatibility/2006" xmlns:p14="http://schemas.microsoft.com/office/powerpoint/2010/main">
+    <mc:Choice Requires="p14">
+      <p:transition p14:dur="0"/>
+    </mc:Choice>
+    <mc:Fallback xmlns="">
+      <p:transition/>
+    </mc:Fallback>
+  </mc:AlternateContent>
+</p:sld>
+</file>
+
+<file path=ppt/slides/slide20.xml><?xml version="1.0" encoding="utf-8"?>
 <p:sld xmlns:a="http://schemas.openxmlformats.org/drawingml/2006/main" xmlns:r="http://schemas.openxmlformats.org/officeDocument/2006/relationships" xmlns:p="http://schemas.openxmlformats.org/presentationml/2006/main">
   <p:cSld>
     <p:spTree>
@@ -25827,16 +25190,16 @@
 <file path=customXml/itemProps1.xml><?xml version="1.0" encoding="utf-8"?>
 <ds:datastoreItem xmlns:ds="http://schemas.openxmlformats.org/officeDocument/2006/customXml" ds:itemID="{F990F116-B58F-4255-B05B-DA3808E0E5C6}">
   <ds:schemaRefs>
+    <ds:schemaRef ds:uri="7103900f-b061-460a-8ad9-efdaab4d8364"/>
+    <ds:schemaRef ds:uri="http://purl.org/dc/terms/"/>
     <ds:schemaRef ds:uri="http://purl.org/dc/dcmitype/"/>
-    <ds:schemaRef ds:uri="http://schemas.microsoft.com/sharepoint/v3"/>
+    <ds:schemaRef ds:uri="http://schemas.microsoft.com/office/infopath/2007/PartnerControls"/>
+    <ds:schemaRef ds:uri="http://schemas.microsoft.com/office/2006/documentManagement/types"/>
     <ds:schemaRef ds:uri="http://purl.org/dc/elements/1.1/"/>
     <ds:schemaRef ds:uri="http://schemas.microsoft.com/office/2006/metadata/properties"/>
     <ds:schemaRef ds:uri="http://schemas.openxmlformats.org/package/2006/metadata/core-properties"/>
-    <ds:schemaRef ds:uri="http://schemas.microsoft.com/office/infopath/2007/PartnerControls"/>
-    <ds:schemaRef ds:uri="http://purl.org/dc/terms/"/>
-    <ds:schemaRef ds:uri="http://schemas.microsoft.com/office/2006/documentManagement/types"/>
-    <ds:schemaRef ds:uri="7103900f-b061-460a-8ad9-efdaab4d8364"/>
     <ds:schemaRef ds:uri="446f52d6-eb27-49b2-9036-2aa20c29b5d6"/>
+    <ds:schemaRef ds:uri="http://schemas.microsoft.com/sharepoint/v3"/>
     <ds:schemaRef ds:uri="http://www.w3.org/XML/1998/namespace"/>
   </ds:schemaRefs>
 </ds:datastoreItem>

</xml_diff>